<commit_message>
git and references slide
</commit_message>
<xml_diff>
--- a/democamp-indigo/Integrating Git, Gerrit and Jenkins with Mylyn.pptx
+++ b/democamp-indigo/Integrating Git, Gerrit and Jenkins with Mylyn.pptx
@@ -5,18 +5,20 @@
     <p:sldMasterId id="2147483660" r:id="rId1"/>
   </p:sldMasterIdLst>
   <p:notesMasterIdLst>
-    <p:notesMasterId r:id="rId8"/>
+    <p:notesMasterId r:id="rId10"/>
   </p:notesMasterIdLst>
   <p:handoutMasterIdLst>
-    <p:handoutMasterId r:id="rId9"/>
+    <p:handoutMasterId r:id="rId11"/>
   </p:handoutMasterIdLst>
   <p:sldIdLst>
     <p:sldId id="340" r:id="rId2"/>
     <p:sldId id="284" r:id="rId3"/>
-    <p:sldId id="341" r:id="rId4"/>
-    <p:sldId id="310" r:id="rId5"/>
-    <p:sldId id="265" r:id="rId6"/>
-    <p:sldId id="339" r:id="rId7"/>
+    <p:sldId id="342" r:id="rId4"/>
+    <p:sldId id="341" r:id="rId5"/>
+    <p:sldId id="310" r:id="rId6"/>
+    <p:sldId id="343" r:id="rId7"/>
+    <p:sldId id="265" r:id="rId8"/>
+    <p:sldId id="339" r:id="rId9"/>
   </p:sldIdLst>
   <p:sldSz cx="9144000" cy="6858000" type="screen4x3"/>
   <p:notesSz cx="6858000" cy="9144000"/>
@@ -807,31 +809,7 @@
       </p:grpSpPr>
       <p:sp>
         <p:nvSpPr>
-          <p:cNvPr id="4" name="Slide Number Placeholder 3"/>
-          <p:cNvSpPr>
-            <a:spLocks noGrp="1"/>
-          </p:cNvSpPr>
-          <p:nvPr>
-            <p:ph type="sldNum" sz="quarter" idx="10"/>
-          </p:nvPr>
-        </p:nvSpPr>
-        <p:spPr/>
-        <p:txBody>
-          <a:bodyPr/>
-          <a:lstStyle/>
-          <a:p>
-            <a:fld id="{7D8C2C35-2B8A-446E-BEC0-FD36716C29AC}" type="slidenum">
-              <a:rPr lang="de-DE" smtClean="0"/>
-              <a:pPr/>
-              <a:t>5</a:t>
-            </a:fld>
-            <a:endParaRPr lang="de-DE" dirty="0"/>
-          </a:p>
-        </p:txBody>
-      </p:sp>
-      <p:sp>
-        <p:nvSpPr>
-          <p:cNvPr id="15" name="Slide Image Placeholder 14"/>
+          <p:cNvPr id="2" name="Slide Image Placeholder 1"/>
           <p:cNvSpPr>
             <a:spLocks noGrp="1" noRot="1" noChangeAspect="1"/>
           </p:cNvSpPr>
@@ -843,7 +821,7 @@
       </p:sp>
       <p:sp>
         <p:nvSpPr>
-          <p:cNvPr id="16" name="Notes Placeholder 15"/>
+          <p:cNvPr id="3" name="Notes Placeholder 2"/>
           <p:cNvSpPr>
             <a:spLocks noGrp="1"/>
           </p:cNvSpPr>
@@ -858,6 +836,30 @@
           </a:bodyPr>
           <a:lstStyle/>
           <a:p>
+            <a:endParaRPr lang="en-US" dirty="0"/>
+          </a:p>
+        </p:txBody>
+      </p:sp>
+      <p:sp>
+        <p:nvSpPr>
+          <p:cNvPr id="4" name="Slide Number Placeholder 3"/>
+          <p:cNvSpPr>
+            <a:spLocks noGrp="1"/>
+          </p:cNvSpPr>
+          <p:nvPr>
+            <p:ph type="sldNum" sz="quarter" idx="10"/>
+          </p:nvPr>
+        </p:nvSpPr>
+        <p:spPr/>
+        <p:txBody>
+          <a:bodyPr/>
+          <a:lstStyle/>
+          <a:p>
+            <a:fld id="{7D8C2C35-2B8A-446E-BEC0-FD36716C29AC}" type="slidenum">
+              <a:rPr lang="de-DE" smtClean="0"/>
+              <a:pPr/>
+              <a:t>5</a:t>
+            </a:fld>
             <a:endParaRPr lang="de-DE" dirty="0"/>
           </a:p>
         </p:txBody>
@@ -939,6 +941,170 @@
               <a:rPr lang="de-DE" smtClean="0"/>
               <a:pPr/>
               <a:t>6</a:t>
+            </a:fld>
+            <a:endParaRPr lang="de-DE" dirty="0"/>
+          </a:p>
+        </p:txBody>
+      </p:sp>
+    </p:spTree>
+  </p:cSld>
+  <p:clrMapOvr>
+    <a:masterClrMapping/>
+  </p:clrMapOvr>
+</p:notes>
+</file>
+
+<file path=ppt/notesSlides/notesSlide7.xml><?xml version="1.0" encoding="utf-8"?>
+<p:notes xmlns:a="http://schemas.openxmlformats.org/drawingml/2006/main" xmlns:r="http://schemas.openxmlformats.org/officeDocument/2006/relationships" xmlns:p="http://schemas.openxmlformats.org/presentationml/2006/main">
+  <p:cSld>
+    <p:spTree>
+      <p:nvGrpSpPr>
+        <p:cNvPr id="1" name=""/>
+        <p:cNvGrpSpPr/>
+        <p:nvPr/>
+      </p:nvGrpSpPr>
+      <p:grpSpPr>
+        <a:xfrm>
+          <a:off x="0" y="0"/>
+          <a:ext cx="0" cy="0"/>
+          <a:chOff x="0" y="0"/>
+          <a:chExt cx="0" cy="0"/>
+        </a:xfrm>
+      </p:grpSpPr>
+      <p:sp>
+        <p:nvSpPr>
+          <p:cNvPr id="4" name="Slide Number Placeholder 3"/>
+          <p:cNvSpPr>
+            <a:spLocks noGrp="1"/>
+          </p:cNvSpPr>
+          <p:nvPr>
+            <p:ph type="sldNum" sz="quarter" idx="10"/>
+          </p:nvPr>
+        </p:nvSpPr>
+        <p:spPr/>
+        <p:txBody>
+          <a:bodyPr/>
+          <a:lstStyle/>
+          <a:p>
+            <a:fld id="{7D8C2C35-2B8A-446E-BEC0-FD36716C29AC}" type="slidenum">
+              <a:rPr lang="de-DE" smtClean="0"/>
+              <a:pPr/>
+              <a:t>7</a:t>
+            </a:fld>
+            <a:endParaRPr lang="de-DE" dirty="0"/>
+          </a:p>
+        </p:txBody>
+      </p:sp>
+      <p:sp>
+        <p:nvSpPr>
+          <p:cNvPr id="15" name="Slide Image Placeholder 14"/>
+          <p:cNvSpPr>
+            <a:spLocks noGrp="1" noRot="1" noChangeAspect="1"/>
+          </p:cNvSpPr>
+          <p:nvPr>
+            <p:ph type="sldImg"/>
+          </p:nvPr>
+        </p:nvSpPr>
+        <p:spPr/>
+      </p:sp>
+      <p:sp>
+        <p:nvSpPr>
+          <p:cNvPr id="16" name="Notes Placeholder 15"/>
+          <p:cNvSpPr>
+            <a:spLocks noGrp="1"/>
+          </p:cNvSpPr>
+          <p:nvPr>
+            <p:ph type="body" idx="1"/>
+          </p:nvPr>
+        </p:nvSpPr>
+        <p:spPr/>
+        <p:txBody>
+          <a:bodyPr>
+            <a:normAutofit/>
+          </a:bodyPr>
+          <a:lstStyle/>
+          <a:p>
+            <a:endParaRPr lang="de-DE" dirty="0"/>
+          </a:p>
+        </p:txBody>
+      </p:sp>
+    </p:spTree>
+  </p:cSld>
+  <p:clrMapOvr>
+    <a:masterClrMapping/>
+  </p:clrMapOvr>
+</p:notes>
+</file>
+
+<file path=ppt/notesSlides/notesSlide8.xml><?xml version="1.0" encoding="utf-8"?>
+<p:notes xmlns:a="http://schemas.openxmlformats.org/drawingml/2006/main" xmlns:r="http://schemas.openxmlformats.org/officeDocument/2006/relationships" xmlns:p="http://schemas.openxmlformats.org/presentationml/2006/main">
+  <p:cSld>
+    <p:spTree>
+      <p:nvGrpSpPr>
+        <p:cNvPr id="1" name=""/>
+        <p:cNvGrpSpPr/>
+        <p:nvPr/>
+      </p:nvGrpSpPr>
+      <p:grpSpPr>
+        <a:xfrm>
+          <a:off x="0" y="0"/>
+          <a:ext cx="0" cy="0"/>
+          <a:chOff x="0" y="0"/>
+          <a:chExt cx="0" cy="0"/>
+        </a:xfrm>
+      </p:grpSpPr>
+      <p:sp>
+        <p:nvSpPr>
+          <p:cNvPr id="2" name="Slide Image Placeholder 1"/>
+          <p:cNvSpPr>
+            <a:spLocks noGrp="1" noRot="1" noChangeAspect="1"/>
+          </p:cNvSpPr>
+          <p:nvPr>
+            <p:ph type="sldImg"/>
+          </p:nvPr>
+        </p:nvSpPr>
+        <p:spPr/>
+      </p:sp>
+      <p:sp>
+        <p:nvSpPr>
+          <p:cNvPr id="3" name="Notes Placeholder 2"/>
+          <p:cNvSpPr>
+            <a:spLocks noGrp="1"/>
+          </p:cNvSpPr>
+          <p:nvPr>
+            <p:ph type="body" idx="1"/>
+          </p:nvPr>
+        </p:nvSpPr>
+        <p:spPr/>
+        <p:txBody>
+          <a:bodyPr>
+            <a:normAutofit/>
+          </a:bodyPr>
+          <a:lstStyle/>
+          <a:p>
+            <a:endParaRPr lang="en-US" dirty="0"/>
+          </a:p>
+        </p:txBody>
+      </p:sp>
+      <p:sp>
+        <p:nvSpPr>
+          <p:cNvPr id="4" name="Slide Number Placeholder 3"/>
+          <p:cNvSpPr>
+            <a:spLocks noGrp="1"/>
+          </p:cNvSpPr>
+          <p:nvPr>
+            <p:ph type="sldNum" sz="quarter" idx="10"/>
+          </p:nvPr>
+        </p:nvSpPr>
+        <p:spPr/>
+        <p:txBody>
+          <a:bodyPr/>
+          <a:lstStyle/>
+          <a:p>
+            <a:fld id="{7D8C2C35-2B8A-446E-BEC0-FD36716C29AC}" type="slidenum">
+              <a:rPr lang="de-DE" smtClean="0"/>
+              <a:pPr/>
+              <a:t>8</a:t>
             </a:fld>
             <a:endParaRPr lang="de-DE" dirty="0"/>
           </a:p>
@@ -6204,16 +6370,6 @@
               </a:rPr>
               <a:t>Internal  </a:t>
             </a:r>
-            <a:endParaRPr kumimoji="0" lang="de-DE" sz="1000" b="0" i="0" u="none" kern="0" baseline="0" dirty="0" smtClean="0">
-              <a:solidFill>
-                <a:srgbClr val="FFFFFF"/>
-              </a:solidFill>
-              <a:effectLst/>
-              <a:latin typeface="Arial"/>
-              <a:ea typeface="Arial Unicode MS"/>
-              <a:cs typeface="Arial Unicode MS" pitchFamily="34" charset="-128"/>
-              <a:sym typeface="Arial"/>
-            </a:endParaRPr>
           </a:p>
         </p:txBody>
       </p:sp>
@@ -6760,7 +6916,6 @@
               <a:rPr lang="en-US" dirty="0" smtClean="0"/>
               <a:t>Sascha Scholz (SAP), Steffen Pingel (Tasktop)</a:t>
             </a:r>
-            <a:endParaRPr lang="en-US" dirty="0" smtClean="0"/>
           </a:p>
         </p:txBody>
       </p:sp>
@@ -6813,7 +6968,7 @@
           <a:p>
             <a:r>
               <a:rPr lang="en-US" dirty="0" smtClean="0"/>
-              <a:t>Gerrit</a:t>
+              <a:t>Git</a:t>
             </a:r>
             <a:endParaRPr lang="en-US" dirty="0"/>
           </a:p>
@@ -6840,42 +6995,18 @@
             </a:pPr>
             <a:r>
               <a:rPr lang="en-US" dirty="0" smtClean="0"/>
-              <a:t>Web-based code review system based on </a:t>
-            </a:r>
-            <a:r>
-              <a:rPr lang="en-US" dirty="0" err="1" smtClean="0"/>
-              <a:t>JGit</a:t>
+              <a:t>A distributed version control system originally built for the Linux kernel</a:t>
             </a:r>
             <a:endParaRPr lang="en-US" dirty="0" smtClean="0"/>
           </a:p>
           <a:p>
-            <a:pPr marL="342900" lvl="0" indent="-342900">
+            <a:pPr marL="342900" indent="-342900">
               <a:buFont typeface="Arial" pitchFamily="34" charset="0"/>
               <a:buChar char="•"/>
             </a:pPr>
             <a:r>
               <a:rPr lang="en-US" dirty="0" smtClean="0"/>
-              <a:t>Open Source (Apache 2 license)</a:t>
-            </a:r>
-          </a:p>
-          <a:p>
-            <a:pPr marL="342900" lvl="0" indent="-342900">
-              <a:buFont typeface="Arial" pitchFamily="34" charset="0"/>
-              <a:buChar char="•"/>
-            </a:pPr>
-            <a:r>
-              <a:rPr lang="en-US" dirty="0" smtClean="0"/>
-              <a:t>Also serves as Git server adding access control and workflow</a:t>
-            </a:r>
-          </a:p>
-          <a:p>
-            <a:pPr marL="342900" lvl="0" indent="-342900">
-              <a:buFont typeface="Arial" pitchFamily="34" charset="0"/>
-              <a:buChar char="•"/>
-            </a:pPr>
-            <a:r>
-              <a:rPr lang="en-US" dirty="0" smtClean="0"/>
-              <a:t>Used by</a:t>
+              <a:t>Offline support</a:t>
             </a:r>
           </a:p>
           <a:p>
@@ -6885,8 +7016,17 @@
             </a:pPr>
             <a:r>
               <a:rPr lang="en-US" dirty="0" smtClean="0"/>
-              <a:t>Android</a:t>
-            </a:r>
+              <a:t>Local </a:t>
+            </a:r>
+            <a:r>
+              <a:rPr lang="en-US" dirty="0" smtClean="0"/>
+              <a:t>repository clone contains full </a:t>
+            </a:r>
+            <a:r>
+              <a:rPr lang="en-US" dirty="0" smtClean="0"/>
+              <a:t>history</a:t>
+            </a:r>
+            <a:endParaRPr lang="en-US" dirty="0" smtClean="0"/>
           </a:p>
           <a:p>
             <a:pPr marL="612775" lvl="2" indent="-342900">
@@ -6894,20 +7034,8 @@
               <a:buChar char="•"/>
             </a:pPr>
             <a:r>
-              <a:rPr lang="en-US" dirty="0" err="1" smtClean="0"/>
-              <a:t>JGit</a:t>
-            </a:r>
-            <a:r>
-              <a:rPr lang="en-US" dirty="0" smtClean="0"/>
-              <a:t>, </a:t>
-            </a:r>
-            <a:r>
-              <a:rPr lang="en-US" dirty="0" err="1" smtClean="0"/>
-              <a:t>Egit</a:t>
-            </a:r>
-            <a:r>
-              <a:rPr lang="en-US" dirty="0" smtClean="0"/>
-              <a:t> (other Eclipse projects want it…)</a:t>
+              <a:rPr lang="en-US" dirty="0" smtClean="0"/>
+              <a:t>Easy branching and merging</a:t>
             </a:r>
           </a:p>
           <a:p>
@@ -6917,7 +7045,7 @@
             </a:pPr>
             <a:r>
               <a:rPr lang="en-US" dirty="0" smtClean="0"/>
-              <a:t>Google</a:t>
+              <a:t>Typical workflow: commit, fetch, merge/rebase, push</a:t>
             </a:r>
           </a:p>
           <a:p>
@@ -6925,14 +7053,2727 @@
               <a:buFont typeface="Arial" pitchFamily="34" charset="0"/>
               <a:buChar char="•"/>
             </a:pPr>
-            <a:r>
-              <a:rPr lang="en-US" dirty="0" smtClean="0"/>
-              <a:t>SAP</a:t>
+            <a:endParaRPr lang="en-US" dirty="0" smtClean="0"/>
+          </a:p>
+          <a:p>
+            <a:pPr marL="342900" indent="-342900">
+              <a:buFont typeface="Arial" pitchFamily="34" charset="0"/>
+              <a:buChar char="•"/>
+            </a:pPr>
+            <a:r>
+              <a:rPr lang="en-US" dirty="0" err="1" smtClean="0"/>
+              <a:t>EGit</a:t>
+            </a:r>
+            <a:r>
+              <a:rPr lang="en-US" dirty="0" smtClean="0"/>
+              <a:t> is an Eclipse team provider for Git</a:t>
+            </a:r>
+          </a:p>
+          <a:p>
+            <a:pPr marL="342900" indent="-342900">
+              <a:buFont typeface="Arial" pitchFamily="34" charset="0"/>
+              <a:buChar char="•"/>
+            </a:pPr>
+            <a:r>
+              <a:rPr lang="en-US" dirty="0" smtClean="0"/>
+              <a:t>JGit is a lightweight Java library implementing Git</a:t>
             </a:r>
             <a:endParaRPr lang="en-US" dirty="0" smtClean="0"/>
           </a:p>
         </p:txBody>
       </p:sp>
+      <p:pic>
+        <p:nvPicPr>
+          <p:cNvPr id="4" name="Picture 7"/>
+          <p:cNvPicPr>
+            <a:picLocks noChangeAspect="1" noChangeArrowheads="1"/>
+          </p:cNvPicPr>
+          <p:nvPr/>
+        </p:nvPicPr>
+        <p:blipFill>
+          <a:blip r:embed="rId3" cstate="print"/>
+          <a:srcRect/>
+          <a:stretch>
+            <a:fillRect/>
+          </a:stretch>
+        </p:blipFill>
+        <p:spPr bwMode="auto">
+          <a:xfrm>
+            <a:off x="8101013" y="419100"/>
+            <a:ext cx="896937" cy="514350"/>
+          </a:xfrm>
+          <a:prstGeom prst="rect">
+            <a:avLst/>
+          </a:prstGeom>
+          <a:noFill/>
+          <a:ln w="9525">
+            <a:noFill/>
+            <a:miter lim="800000"/>
+            <a:headEnd/>
+            <a:tailEnd/>
+          </a:ln>
+        </p:spPr>
+      </p:pic>
+      <p:grpSp>
+        <p:nvGrpSpPr>
+          <p:cNvPr id="41" name="Group 40"/>
+          <p:cNvGrpSpPr/>
+          <p:nvPr/>
+        </p:nvGrpSpPr>
+        <p:grpSpPr>
+          <a:xfrm>
+            <a:off x="5318543" y="2294965"/>
+            <a:ext cx="3576033" cy="2641413"/>
+            <a:chOff x="4805363" y="3086100"/>
+            <a:chExt cx="5102225" cy="3768725"/>
+          </a:xfrm>
+        </p:grpSpPr>
+        <p:pic>
+          <p:nvPicPr>
+            <p:cNvPr id="6" name="Picture 29"/>
+            <p:cNvPicPr>
+              <a:picLocks noChangeAspect="1" noChangeArrowheads="1"/>
+            </p:cNvPicPr>
+            <p:nvPr/>
+          </p:nvPicPr>
+          <p:blipFill>
+            <a:blip r:embed="rId4" cstate="print"/>
+            <a:srcRect/>
+            <a:stretch>
+              <a:fillRect/>
+            </a:stretch>
+          </p:blipFill>
+          <p:spPr bwMode="auto">
+            <a:xfrm>
+              <a:off x="7016750" y="6419850"/>
+              <a:ext cx="434975" cy="434975"/>
+            </a:xfrm>
+            <a:prstGeom prst="rect">
+              <a:avLst/>
+            </a:prstGeom>
+            <a:noFill/>
+            <a:ln w="9525">
+              <a:noFill/>
+              <a:miter lim="800000"/>
+              <a:headEnd/>
+              <a:tailEnd/>
+            </a:ln>
+          </p:spPr>
+        </p:pic>
+        <p:sp>
+          <p:nvSpPr>
+            <p:cNvPr id="7" name="Text Box 30"/>
+            <p:cNvSpPr txBox="1">
+              <a:spLocks noChangeArrowheads="1"/>
+            </p:cNvSpPr>
+            <p:nvPr/>
+          </p:nvSpPr>
+          <p:spPr bwMode="auto">
+            <a:xfrm>
+              <a:off x="7097713" y="6560106"/>
+              <a:ext cx="279400" cy="160813"/>
+            </a:xfrm>
+            <a:prstGeom prst="rect">
+              <a:avLst/>
+            </a:prstGeom>
+            <a:noFill/>
+            <a:ln>
+              <a:noFill/>
+            </a:ln>
+            <a:effectLst/>
+            <a:extLst>
+              <a:ext uri="{909E8E84-426E-40dd-AFC4-6F175D3DCCD1}">
+                <a14:hiddenFill xmlns:a14="http://schemas.microsoft.com/office/drawing/2010/main" xmlns="">
+                  <a:solidFill>
+                    <a:schemeClr val="accent1"/>
+                  </a:solidFill>
+                </a14:hiddenFill>
+              </a:ext>
+              <a:ext uri="{91240B29-F687-4f45-9708-019B960494DF}">
+                <a14:hiddenLine xmlns:a14="http://schemas.microsoft.com/office/drawing/2010/main" xmlns="" w="9525">
+                  <a:solidFill>
+                    <a:schemeClr val="tx1"/>
+                  </a:solidFill>
+                  <a:miter lim="800000"/>
+                  <a:headEnd/>
+                  <a:tailEnd/>
+                </a14:hiddenLine>
+              </a:ext>
+              <a:ext uri="{AF507438-7753-43e0-B8FC-AC1667EBCBE1}">
+                <a14:hiddenEffects xmlns:a14="http://schemas.microsoft.com/office/drawing/2010/main" xmlns="">
+                  <a:effectLst>
+                    <a:outerShdw blurRad="63500" dist="38099" dir="2700000" algn="ctr" rotWithShape="0">
+                      <a:schemeClr val="bg2">
+                        <a:alpha val="74998"/>
+                      </a:schemeClr>
+                    </a:outerShdw>
+                  </a:effectLst>
+                </a14:hiddenEffects>
+              </a:ext>
+            </a:extLst>
+          </p:spPr>
+          <p:txBody>
+            <a:bodyPr lIns="0" tIns="0" rIns="0" bIns="0" anchor="ctr">
+              <a:spAutoFit/>
+            </a:bodyPr>
+            <a:lstStyle>
+              <a:lvl1pPr>
+                <a:defRPr sz="2400">
+                  <a:solidFill>
+                    <a:schemeClr val="tx1"/>
+                  </a:solidFill>
+                  <a:latin typeface="Times New Roman" charset="0"/>
+                  <a:ea typeface="ＭＳ Ｐゴシック" charset="0"/>
+                </a:defRPr>
+              </a:lvl1pPr>
+              <a:lvl2pPr indent="-342900">
+                <a:defRPr sz="2400">
+                  <a:solidFill>
+                    <a:schemeClr val="tx1"/>
+                  </a:solidFill>
+                  <a:latin typeface="Times New Roman" charset="0"/>
+                  <a:ea typeface="ＭＳ Ｐゴシック" charset="0"/>
+                </a:defRPr>
+              </a:lvl2pPr>
+              <a:lvl3pPr marL="857250" indent="-285750">
+                <a:defRPr sz="2400">
+                  <a:solidFill>
+                    <a:schemeClr val="tx1"/>
+                  </a:solidFill>
+                  <a:latin typeface="Times New Roman" charset="0"/>
+                  <a:ea typeface="ＭＳ Ｐゴシック" charset="0"/>
+                </a:defRPr>
+              </a:lvl3pPr>
+              <a:lvl4pPr marL="1257300" indent="-228600">
+                <a:defRPr sz="2400">
+                  <a:solidFill>
+                    <a:schemeClr val="tx1"/>
+                  </a:solidFill>
+                  <a:latin typeface="Times New Roman" charset="0"/>
+                  <a:ea typeface="ＭＳ Ｐゴシック" charset="0"/>
+                </a:defRPr>
+              </a:lvl4pPr>
+              <a:lvl5pPr marL="1714500" indent="-228600">
+                <a:defRPr sz="2400">
+                  <a:solidFill>
+                    <a:schemeClr val="tx1"/>
+                  </a:solidFill>
+                  <a:latin typeface="Times New Roman" charset="0"/>
+                  <a:ea typeface="ＭＳ Ｐゴシック" charset="0"/>
+                </a:defRPr>
+              </a:lvl5pPr>
+              <a:lvl6pPr marL="2171700" indent="-228600" fontAlgn="base">
+                <a:spcBef>
+                  <a:spcPct val="0"/>
+                </a:spcBef>
+                <a:spcAft>
+                  <a:spcPct val="0"/>
+                </a:spcAft>
+                <a:defRPr sz="2400">
+                  <a:solidFill>
+                    <a:schemeClr val="tx1"/>
+                  </a:solidFill>
+                  <a:latin typeface="Times New Roman" charset="0"/>
+                  <a:ea typeface="ＭＳ Ｐゴシック" charset="0"/>
+                </a:defRPr>
+              </a:lvl6pPr>
+              <a:lvl7pPr marL="2628900" indent="-228600" fontAlgn="base">
+                <a:spcBef>
+                  <a:spcPct val="0"/>
+                </a:spcBef>
+                <a:spcAft>
+                  <a:spcPct val="0"/>
+                </a:spcAft>
+                <a:defRPr sz="2400">
+                  <a:solidFill>
+                    <a:schemeClr val="tx1"/>
+                  </a:solidFill>
+                  <a:latin typeface="Times New Roman" charset="0"/>
+                  <a:ea typeface="ＭＳ Ｐゴシック" charset="0"/>
+                </a:defRPr>
+              </a:lvl7pPr>
+              <a:lvl8pPr marL="3086100" indent="-228600" fontAlgn="base">
+                <a:spcBef>
+                  <a:spcPct val="0"/>
+                </a:spcBef>
+                <a:spcAft>
+                  <a:spcPct val="0"/>
+                </a:spcAft>
+                <a:defRPr sz="2400">
+                  <a:solidFill>
+                    <a:schemeClr val="tx1"/>
+                  </a:solidFill>
+                  <a:latin typeface="Times New Roman" charset="0"/>
+                  <a:ea typeface="ＭＳ Ｐゴシック" charset="0"/>
+                </a:defRPr>
+              </a:lvl8pPr>
+              <a:lvl9pPr marL="3543300" indent="-228600" fontAlgn="base">
+                <a:spcBef>
+                  <a:spcPct val="0"/>
+                </a:spcBef>
+                <a:spcAft>
+                  <a:spcPct val="0"/>
+                </a:spcAft>
+                <a:defRPr sz="2400">
+                  <a:solidFill>
+                    <a:schemeClr val="tx1"/>
+                  </a:solidFill>
+                  <a:latin typeface="Times New Roman" charset="0"/>
+                  <a:ea typeface="ＭＳ Ｐゴシック" charset="0"/>
+                </a:defRPr>
+              </a:lvl9pPr>
+            </a:lstStyle>
+            <a:p>
+              <a:pPr algn="ctr">
+                <a:lnSpc>
+                  <a:spcPct val="95000"/>
+                </a:lnSpc>
+                <a:defRPr/>
+              </a:pPr>
+              <a:r>
+                <a:rPr lang="en-US" sz="1100" smtClean="0">
+                  <a:solidFill>
+                    <a:srgbClr val="000000"/>
+                  </a:solidFill>
+                  <a:latin typeface="Arial" charset="0"/>
+                </a:rPr>
+                <a:t>A</a:t>
+              </a:r>
+            </a:p>
+          </p:txBody>
+        </p:sp>
+        <p:pic>
+          <p:nvPicPr>
+            <p:cNvPr id="8" name="Picture 31"/>
+            <p:cNvPicPr>
+              <a:picLocks noChangeAspect="1" noChangeArrowheads="1"/>
+            </p:cNvPicPr>
+            <p:nvPr/>
+          </p:nvPicPr>
+          <p:blipFill>
+            <a:blip r:embed="rId4" cstate="print"/>
+            <a:srcRect/>
+            <a:stretch>
+              <a:fillRect/>
+            </a:stretch>
+          </p:blipFill>
+          <p:spPr bwMode="auto">
+            <a:xfrm>
+              <a:off x="7016750" y="5626100"/>
+              <a:ext cx="434975" cy="434975"/>
+            </a:xfrm>
+            <a:prstGeom prst="rect">
+              <a:avLst/>
+            </a:prstGeom>
+            <a:noFill/>
+            <a:ln w="9525">
+              <a:noFill/>
+              <a:miter lim="800000"/>
+              <a:headEnd/>
+              <a:tailEnd/>
+            </a:ln>
+          </p:spPr>
+        </p:pic>
+        <p:sp>
+          <p:nvSpPr>
+            <p:cNvPr id="9" name="Text Box 32"/>
+            <p:cNvSpPr txBox="1">
+              <a:spLocks noChangeArrowheads="1"/>
+            </p:cNvSpPr>
+            <p:nvPr/>
+          </p:nvSpPr>
+          <p:spPr bwMode="auto">
+            <a:xfrm>
+              <a:off x="7097713" y="5766356"/>
+              <a:ext cx="279400" cy="160813"/>
+            </a:xfrm>
+            <a:prstGeom prst="rect">
+              <a:avLst/>
+            </a:prstGeom>
+            <a:noFill/>
+            <a:ln>
+              <a:noFill/>
+            </a:ln>
+            <a:effectLst/>
+            <a:extLst>
+              <a:ext uri="{909E8E84-426E-40dd-AFC4-6F175D3DCCD1}">
+                <a14:hiddenFill xmlns:a14="http://schemas.microsoft.com/office/drawing/2010/main" xmlns="">
+                  <a:solidFill>
+                    <a:schemeClr val="accent1"/>
+                  </a:solidFill>
+                </a14:hiddenFill>
+              </a:ext>
+              <a:ext uri="{91240B29-F687-4f45-9708-019B960494DF}">
+                <a14:hiddenLine xmlns:a14="http://schemas.microsoft.com/office/drawing/2010/main" xmlns="" w="9525">
+                  <a:solidFill>
+                    <a:schemeClr val="tx1"/>
+                  </a:solidFill>
+                  <a:miter lim="800000"/>
+                  <a:headEnd/>
+                  <a:tailEnd/>
+                </a14:hiddenLine>
+              </a:ext>
+              <a:ext uri="{AF507438-7753-43e0-B8FC-AC1667EBCBE1}">
+                <a14:hiddenEffects xmlns:a14="http://schemas.microsoft.com/office/drawing/2010/main" xmlns="">
+                  <a:effectLst>
+                    <a:outerShdw blurRad="63500" dist="38099" dir="2700000" algn="ctr" rotWithShape="0">
+                      <a:schemeClr val="bg2">
+                        <a:alpha val="74998"/>
+                      </a:schemeClr>
+                    </a:outerShdw>
+                  </a:effectLst>
+                </a14:hiddenEffects>
+              </a:ext>
+            </a:extLst>
+          </p:spPr>
+          <p:txBody>
+            <a:bodyPr lIns="0" tIns="0" rIns="0" bIns="0" anchor="ctr">
+              <a:spAutoFit/>
+            </a:bodyPr>
+            <a:lstStyle>
+              <a:lvl1pPr>
+                <a:defRPr sz="2400">
+                  <a:solidFill>
+                    <a:schemeClr val="tx1"/>
+                  </a:solidFill>
+                  <a:latin typeface="Times New Roman" charset="0"/>
+                  <a:ea typeface="ＭＳ Ｐゴシック" charset="0"/>
+                </a:defRPr>
+              </a:lvl1pPr>
+              <a:lvl2pPr indent="-342900">
+                <a:defRPr sz="2400">
+                  <a:solidFill>
+                    <a:schemeClr val="tx1"/>
+                  </a:solidFill>
+                  <a:latin typeface="Times New Roman" charset="0"/>
+                  <a:ea typeface="ＭＳ Ｐゴシック" charset="0"/>
+                </a:defRPr>
+              </a:lvl2pPr>
+              <a:lvl3pPr marL="857250" indent="-285750">
+                <a:defRPr sz="2400">
+                  <a:solidFill>
+                    <a:schemeClr val="tx1"/>
+                  </a:solidFill>
+                  <a:latin typeface="Times New Roman" charset="0"/>
+                  <a:ea typeface="ＭＳ Ｐゴシック" charset="0"/>
+                </a:defRPr>
+              </a:lvl3pPr>
+              <a:lvl4pPr marL="1257300" indent="-228600">
+                <a:defRPr sz="2400">
+                  <a:solidFill>
+                    <a:schemeClr val="tx1"/>
+                  </a:solidFill>
+                  <a:latin typeface="Times New Roman" charset="0"/>
+                  <a:ea typeface="ＭＳ Ｐゴシック" charset="0"/>
+                </a:defRPr>
+              </a:lvl4pPr>
+              <a:lvl5pPr marL="1714500" indent="-228600">
+                <a:defRPr sz="2400">
+                  <a:solidFill>
+                    <a:schemeClr val="tx1"/>
+                  </a:solidFill>
+                  <a:latin typeface="Times New Roman" charset="0"/>
+                  <a:ea typeface="ＭＳ Ｐゴシック" charset="0"/>
+                </a:defRPr>
+              </a:lvl5pPr>
+              <a:lvl6pPr marL="2171700" indent="-228600" fontAlgn="base">
+                <a:spcBef>
+                  <a:spcPct val="0"/>
+                </a:spcBef>
+                <a:spcAft>
+                  <a:spcPct val="0"/>
+                </a:spcAft>
+                <a:defRPr sz="2400">
+                  <a:solidFill>
+                    <a:schemeClr val="tx1"/>
+                  </a:solidFill>
+                  <a:latin typeface="Times New Roman" charset="0"/>
+                  <a:ea typeface="ＭＳ Ｐゴシック" charset="0"/>
+                </a:defRPr>
+              </a:lvl6pPr>
+              <a:lvl7pPr marL="2628900" indent="-228600" fontAlgn="base">
+                <a:spcBef>
+                  <a:spcPct val="0"/>
+                </a:spcBef>
+                <a:spcAft>
+                  <a:spcPct val="0"/>
+                </a:spcAft>
+                <a:defRPr sz="2400">
+                  <a:solidFill>
+                    <a:schemeClr val="tx1"/>
+                  </a:solidFill>
+                  <a:latin typeface="Times New Roman" charset="0"/>
+                  <a:ea typeface="ＭＳ Ｐゴシック" charset="0"/>
+                </a:defRPr>
+              </a:lvl7pPr>
+              <a:lvl8pPr marL="3086100" indent="-228600" fontAlgn="base">
+                <a:spcBef>
+                  <a:spcPct val="0"/>
+                </a:spcBef>
+                <a:spcAft>
+                  <a:spcPct val="0"/>
+                </a:spcAft>
+                <a:defRPr sz="2400">
+                  <a:solidFill>
+                    <a:schemeClr val="tx1"/>
+                  </a:solidFill>
+                  <a:latin typeface="Times New Roman" charset="0"/>
+                  <a:ea typeface="ＭＳ Ｐゴシック" charset="0"/>
+                </a:defRPr>
+              </a:lvl8pPr>
+              <a:lvl9pPr marL="3543300" indent="-228600" fontAlgn="base">
+                <a:spcBef>
+                  <a:spcPct val="0"/>
+                </a:spcBef>
+                <a:spcAft>
+                  <a:spcPct val="0"/>
+                </a:spcAft>
+                <a:defRPr sz="2400">
+                  <a:solidFill>
+                    <a:schemeClr val="tx1"/>
+                  </a:solidFill>
+                  <a:latin typeface="Times New Roman" charset="0"/>
+                  <a:ea typeface="ＭＳ Ｐゴシック" charset="0"/>
+                </a:defRPr>
+              </a:lvl9pPr>
+            </a:lstStyle>
+            <a:p>
+              <a:pPr algn="ctr">
+                <a:lnSpc>
+                  <a:spcPct val="95000"/>
+                </a:lnSpc>
+                <a:defRPr/>
+              </a:pPr>
+              <a:r>
+                <a:rPr lang="en-US" sz="1100" smtClean="0">
+                  <a:solidFill>
+                    <a:srgbClr val="000000"/>
+                  </a:solidFill>
+                  <a:latin typeface="Arial" charset="0"/>
+                </a:rPr>
+                <a:t>B</a:t>
+              </a:r>
+            </a:p>
+          </p:txBody>
+        </p:sp>
+        <p:pic>
+          <p:nvPicPr>
+            <p:cNvPr id="10" name="Picture 33"/>
+            <p:cNvPicPr>
+              <a:picLocks noChangeAspect="1" noChangeArrowheads="1"/>
+            </p:cNvPicPr>
+            <p:nvPr/>
+          </p:nvPicPr>
+          <p:blipFill>
+            <a:blip r:embed="rId5" cstate="print"/>
+            <a:srcRect/>
+            <a:stretch>
+              <a:fillRect/>
+            </a:stretch>
+          </p:blipFill>
+          <p:spPr bwMode="auto">
+            <a:xfrm>
+              <a:off x="7016750" y="4759325"/>
+              <a:ext cx="434975" cy="434975"/>
+            </a:xfrm>
+            <a:prstGeom prst="rect">
+              <a:avLst/>
+            </a:prstGeom>
+            <a:noFill/>
+            <a:ln w="9525">
+              <a:noFill/>
+              <a:miter lim="800000"/>
+              <a:headEnd/>
+              <a:tailEnd/>
+            </a:ln>
+          </p:spPr>
+        </p:pic>
+        <p:sp>
+          <p:nvSpPr>
+            <p:cNvPr id="11" name="Text Box 34"/>
+            <p:cNvSpPr txBox="1">
+              <a:spLocks noChangeArrowheads="1"/>
+            </p:cNvSpPr>
+            <p:nvPr/>
+          </p:nvSpPr>
+          <p:spPr bwMode="auto">
+            <a:xfrm>
+              <a:off x="7097713" y="4893231"/>
+              <a:ext cx="279400" cy="160813"/>
+            </a:xfrm>
+            <a:prstGeom prst="rect">
+              <a:avLst/>
+            </a:prstGeom>
+            <a:noFill/>
+            <a:ln>
+              <a:noFill/>
+            </a:ln>
+            <a:effectLst/>
+            <a:extLst>
+              <a:ext uri="{909E8E84-426E-40dd-AFC4-6F175D3DCCD1}">
+                <a14:hiddenFill xmlns:a14="http://schemas.microsoft.com/office/drawing/2010/main" xmlns="">
+                  <a:solidFill>
+                    <a:schemeClr val="accent1"/>
+                  </a:solidFill>
+                </a14:hiddenFill>
+              </a:ext>
+              <a:ext uri="{91240B29-F687-4f45-9708-019B960494DF}">
+                <a14:hiddenLine xmlns:a14="http://schemas.microsoft.com/office/drawing/2010/main" xmlns="" w="9525">
+                  <a:solidFill>
+                    <a:schemeClr val="tx1"/>
+                  </a:solidFill>
+                  <a:miter lim="800000"/>
+                  <a:headEnd/>
+                  <a:tailEnd/>
+                </a14:hiddenLine>
+              </a:ext>
+              <a:ext uri="{AF507438-7753-43e0-B8FC-AC1667EBCBE1}">
+                <a14:hiddenEffects xmlns:a14="http://schemas.microsoft.com/office/drawing/2010/main" xmlns="">
+                  <a:effectLst>
+                    <a:outerShdw blurRad="63500" dist="38099" dir="2700000" algn="ctr" rotWithShape="0">
+                      <a:schemeClr val="bg2">
+                        <a:alpha val="74998"/>
+                      </a:schemeClr>
+                    </a:outerShdw>
+                  </a:effectLst>
+                </a14:hiddenEffects>
+              </a:ext>
+            </a:extLst>
+          </p:spPr>
+          <p:txBody>
+            <a:bodyPr lIns="0" tIns="0" rIns="0" bIns="0" anchor="ctr">
+              <a:spAutoFit/>
+            </a:bodyPr>
+            <a:lstStyle>
+              <a:lvl1pPr>
+                <a:defRPr sz="2400">
+                  <a:solidFill>
+                    <a:schemeClr val="tx1"/>
+                  </a:solidFill>
+                  <a:latin typeface="Times New Roman" charset="0"/>
+                  <a:ea typeface="ＭＳ Ｐゴシック" charset="0"/>
+                </a:defRPr>
+              </a:lvl1pPr>
+              <a:lvl2pPr indent="-342900">
+                <a:defRPr sz="2400">
+                  <a:solidFill>
+                    <a:schemeClr val="tx1"/>
+                  </a:solidFill>
+                  <a:latin typeface="Times New Roman" charset="0"/>
+                  <a:ea typeface="ＭＳ Ｐゴシック" charset="0"/>
+                </a:defRPr>
+              </a:lvl2pPr>
+              <a:lvl3pPr marL="857250" indent="-285750">
+                <a:defRPr sz="2400">
+                  <a:solidFill>
+                    <a:schemeClr val="tx1"/>
+                  </a:solidFill>
+                  <a:latin typeface="Times New Roman" charset="0"/>
+                  <a:ea typeface="ＭＳ Ｐゴシック" charset="0"/>
+                </a:defRPr>
+              </a:lvl3pPr>
+              <a:lvl4pPr marL="1257300" indent="-228600">
+                <a:defRPr sz="2400">
+                  <a:solidFill>
+                    <a:schemeClr val="tx1"/>
+                  </a:solidFill>
+                  <a:latin typeface="Times New Roman" charset="0"/>
+                  <a:ea typeface="ＭＳ Ｐゴシック" charset="0"/>
+                </a:defRPr>
+              </a:lvl4pPr>
+              <a:lvl5pPr marL="1714500" indent="-228600">
+                <a:defRPr sz="2400">
+                  <a:solidFill>
+                    <a:schemeClr val="tx1"/>
+                  </a:solidFill>
+                  <a:latin typeface="Times New Roman" charset="0"/>
+                  <a:ea typeface="ＭＳ Ｐゴシック" charset="0"/>
+                </a:defRPr>
+              </a:lvl5pPr>
+              <a:lvl6pPr marL="2171700" indent="-228600" fontAlgn="base">
+                <a:spcBef>
+                  <a:spcPct val="0"/>
+                </a:spcBef>
+                <a:spcAft>
+                  <a:spcPct val="0"/>
+                </a:spcAft>
+                <a:defRPr sz="2400">
+                  <a:solidFill>
+                    <a:schemeClr val="tx1"/>
+                  </a:solidFill>
+                  <a:latin typeface="Times New Roman" charset="0"/>
+                  <a:ea typeface="ＭＳ Ｐゴシック" charset="0"/>
+                </a:defRPr>
+              </a:lvl6pPr>
+              <a:lvl7pPr marL="2628900" indent="-228600" fontAlgn="base">
+                <a:spcBef>
+                  <a:spcPct val="0"/>
+                </a:spcBef>
+                <a:spcAft>
+                  <a:spcPct val="0"/>
+                </a:spcAft>
+                <a:defRPr sz="2400">
+                  <a:solidFill>
+                    <a:schemeClr val="tx1"/>
+                  </a:solidFill>
+                  <a:latin typeface="Times New Roman" charset="0"/>
+                  <a:ea typeface="ＭＳ Ｐゴシック" charset="0"/>
+                </a:defRPr>
+              </a:lvl7pPr>
+              <a:lvl8pPr marL="3086100" indent="-228600" fontAlgn="base">
+                <a:spcBef>
+                  <a:spcPct val="0"/>
+                </a:spcBef>
+                <a:spcAft>
+                  <a:spcPct val="0"/>
+                </a:spcAft>
+                <a:defRPr sz="2400">
+                  <a:solidFill>
+                    <a:schemeClr val="tx1"/>
+                  </a:solidFill>
+                  <a:latin typeface="Times New Roman" charset="0"/>
+                  <a:ea typeface="ＭＳ Ｐゴシック" charset="0"/>
+                </a:defRPr>
+              </a:lvl8pPr>
+              <a:lvl9pPr marL="3543300" indent="-228600" fontAlgn="base">
+                <a:spcBef>
+                  <a:spcPct val="0"/>
+                </a:spcBef>
+                <a:spcAft>
+                  <a:spcPct val="0"/>
+                </a:spcAft>
+                <a:defRPr sz="2400">
+                  <a:solidFill>
+                    <a:schemeClr val="tx1"/>
+                  </a:solidFill>
+                  <a:latin typeface="Times New Roman" charset="0"/>
+                  <a:ea typeface="ＭＳ Ｐゴシック" charset="0"/>
+                </a:defRPr>
+              </a:lvl9pPr>
+            </a:lstStyle>
+            <a:p>
+              <a:pPr algn="ctr">
+                <a:lnSpc>
+                  <a:spcPct val="95000"/>
+                </a:lnSpc>
+                <a:defRPr/>
+              </a:pPr>
+              <a:r>
+                <a:rPr lang="en-US" sz="1100" smtClean="0">
+                  <a:solidFill>
+                    <a:srgbClr val="000000"/>
+                  </a:solidFill>
+                  <a:latin typeface="Arial" charset="0"/>
+                </a:rPr>
+                <a:t>C</a:t>
+              </a:r>
+            </a:p>
+          </p:txBody>
+        </p:sp>
+        <p:pic>
+          <p:nvPicPr>
+            <p:cNvPr id="12" name="Picture 35"/>
+            <p:cNvPicPr>
+              <a:picLocks noChangeAspect="1" noChangeArrowheads="1"/>
+            </p:cNvPicPr>
+            <p:nvPr/>
+          </p:nvPicPr>
+          <p:blipFill>
+            <a:blip r:embed="rId6" cstate="print"/>
+            <a:srcRect/>
+            <a:stretch>
+              <a:fillRect/>
+            </a:stretch>
+          </p:blipFill>
+          <p:spPr bwMode="auto">
+            <a:xfrm>
+              <a:off x="7229475" y="6038850"/>
+              <a:ext cx="22225" cy="414338"/>
+            </a:xfrm>
+            <a:prstGeom prst="rect">
+              <a:avLst/>
+            </a:prstGeom>
+            <a:noFill/>
+            <a:ln w="9525">
+              <a:noFill/>
+              <a:miter lim="800000"/>
+              <a:headEnd/>
+              <a:tailEnd/>
+            </a:ln>
+          </p:spPr>
+        </p:pic>
+        <p:pic>
+          <p:nvPicPr>
+            <p:cNvPr id="13" name="Picture 36"/>
+            <p:cNvPicPr>
+              <a:picLocks noChangeAspect="1" noChangeArrowheads="1"/>
+            </p:cNvPicPr>
+            <p:nvPr/>
+          </p:nvPicPr>
+          <p:blipFill>
+            <a:blip r:embed="rId7" cstate="print"/>
+            <a:srcRect/>
+            <a:stretch>
+              <a:fillRect/>
+            </a:stretch>
+          </p:blipFill>
+          <p:spPr bwMode="auto">
+            <a:xfrm>
+              <a:off x="7229475" y="5172075"/>
+              <a:ext cx="22225" cy="476250"/>
+            </a:xfrm>
+            <a:prstGeom prst="rect">
+              <a:avLst/>
+            </a:prstGeom>
+            <a:noFill/>
+            <a:ln w="9525">
+              <a:noFill/>
+              <a:miter lim="800000"/>
+              <a:headEnd/>
+              <a:tailEnd/>
+            </a:ln>
+          </p:spPr>
+        </p:pic>
+        <p:pic>
+          <p:nvPicPr>
+            <p:cNvPr id="14" name="Picture 37"/>
+            <p:cNvPicPr>
+              <a:picLocks noChangeAspect="1" noChangeArrowheads="1"/>
+            </p:cNvPicPr>
+            <p:nvPr/>
+          </p:nvPicPr>
+          <p:blipFill>
+            <a:blip r:embed="rId8" cstate="print"/>
+            <a:srcRect/>
+            <a:stretch>
+              <a:fillRect/>
+            </a:stretch>
+          </p:blipFill>
+          <p:spPr bwMode="auto">
+            <a:xfrm>
+              <a:off x="6086475" y="3097213"/>
+              <a:ext cx="561975" cy="434975"/>
+            </a:xfrm>
+            <a:prstGeom prst="rect">
+              <a:avLst/>
+            </a:prstGeom>
+            <a:noFill/>
+            <a:ln w="9525">
+              <a:noFill/>
+              <a:miter lim="800000"/>
+              <a:headEnd/>
+              <a:tailEnd/>
+            </a:ln>
+          </p:spPr>
+        </p:pic>
+        <p:sp>
+          <p:nvSpPr>
+            <p:cNvPr id="15" name="Text Box 38"/>
+            <p:cNvSpPr txBox="1">
+              <a:spLocks noChangeArrowheads="1"/>
+            </p:cNvSpPr>
+            <p:nvPr/>
+          </p:nvSpPr>
+          <p:spPr bwMode="auto">
+            <a:xfrm>
+              <a:off x="6143625" y="3227841"/>
+              <a:ext cx="449263" cy="160813"/>
+            </a:xfrm>
+            <a:prstGeom prst="rect">
+              <a:avLst/>
+            </a:prstGeom>
+            <a:noFill/>
+            <a:ln>
+              <a:noFill/>
+            </a:ln>
+            <a:effectLst/>
+            <a:extLst>
+              <a:ext uri="{909E8E84-426E-40dd-AFC4-6F175D3DCCD1}">
+                <a14:hiddenFill xmlns:a14="http://schemas.microsoft.com/office/drawing/2010/main" xmlns="">
+                  <a:solidFill>
+                    <a:schemeClr val="accent1"/>
+                  </a:solidFill>
+                </a14:hiddenFill>
+              </a:ext>
+              <a:ext uri="{91240B29-F687-4f45-9708-019B960494DF}">
+                <a14:hiddenLine xmlns:a14="http://schemas.microsoft.com/office/drawing/2010/main" xmlns="" w="9525">
+                  <a:solidFill>
+                    <a:schemeClr val="tx1"/>
+                  </a:solidFill>
+                  <a:miter lim="800000"/>
+                  <a:headEnd/>
+                  <a:tailEnd/>
+                </a14:hiddenLine>
+              </a:ext>
+              <a:ext uri="{AF507438-7753-43e0-B8FC-AC1667EBCBE1}">
+                <a14:hiddenEffects xmlns:a14="http://schemas.microsoft.com/office/drawing/2010/main" xmlns="">
+                  <a:effectLst>
+                    <a:outerShdw blurRad="63500" dist="38099" dir="2700000" algn="ctr" rotWithShape="0">
+                      <a:schemeClr val="bg2">
+                        <a:alpha val="74998"/>
+                      </a:schemeClr>
+                    </a:outerShdw>
+                  </a:effectLst>
+                </a14:hiddenEffects>
+              </a:ext>
+            </a:extLst>
+          </p:spPr>
+          <p:txBody>
+            <a:bodyPr lIns="0" tIns="0" rIns="0" bIns="0">
+              <a:spAutoFit/>
+            </a:bodyPr>
+            <a:lstStyle>
+              <a:lvl1pPr>
+                <a:defRPr sz="2400">
+                  <a:solidFill>
+                    <a:schemeClr val="tx1"/>
+                  </a:solidFill>
+                  <a:latin typeface="Times New Roman" charset="0"/>
+                  <a:ea typeface="ＭＳ Ｐゴシック" charset="0"/>
+                </a:defRPr>
+              </a:lvl1pPr>
+              <a:lvl2pPr indent="-342900">
+                <a:defRPr sz="2400">
+                  <a:solidFill>
+                    <a:schemeClr val="tx1"/>
+                  </a:solidFill>
+                  <a:latin typeface="Times New Roman" charset="0"/>
+                  <a:ea typeface="ＭＳ Ｐゴシック" charset="0"/>
+                </a:defRPr>
+              </a:lvl2pPr>
+              <a:lvl3pPr marL="857250" indent="-285750">
+                <a:defRPr sz="2400">
+                  <a:solidFill>
+                    <a:schemeClr val="tx1"/>
+                  </a:solidFill>
+                  <a:latin typeface="Times New Roman" charset="0"/>
+                  <a:ea typeface="ＭＳ Ｐゴシック" charset="0"/>
+                </a:defRPr>
+              </a:lvl3pPr>
+              <a:lvl4pPr marL="1257300" indent="-228600">
+                <a:defRPr sz="2400">
+                  <a:solidFill>
+                    <a:schemeClr val="tx1"/>
+                  </a:solidFill>
+                  <a:latin typeface="Times New Roman" charset="0"/>
+                  <a:ea typeface="ＭＳ Ｐゴシック" charset="0"/>
+                </a:defRPr>
+              </a:lvl4pPr>
+              <a:lvl5pPr marL="1714500" indent="-228600">
+                <a:defRPr sz="2400">
+                  <a:solidFill>
+                    <a:schemeClr val="tx1"/>
+                  </a:solidFill>
+                  <a:latin typeface="Times New Roman" charset="0"/>
+                  <a:ea typeface="ＭＳ Ｐゴシック" charset="0"/>
+                </a:defRPr>
+              </a:lvl5pPr>
+              <a:lvl6pPr marL="2171700" indent="-228600" fontAlgn="base">
+                <a:spcBef>
+                  <a:spcPct val="0"/>
+                </a:spcBef>
+                <a:spcAft>
+                  <a:spcPct val="0"/>
+                </a:spcAft>
+                <a:defRPr sz="2400">
+                  <a:solidFill>
+                    <a:schemeClr val="tx1"/>
+                  </a:solidFill>
+                  <a:latin typeface="Times New Roman" charset="0"/>
+                  <a:ea typeface="ＭＳ Ｐゴシック" charset="0"/>
+                </a:defRPr>
+              </a:lvl6pPr>
+              <a:lvl7pPr marL="2628900" indent="-228600" fontAlgn="base">
+                <a:spcBef>
+                  <a:spcPct val="0"/>
+                </a:spcBef>
+                <a:spcAft>
+                  <a:spcPct val="0"/>
+                </a:spcAft>
+                <a:defRPr sz="2400">
+                  <a:solidFill>
+                    <a:schemeClr val="tx1"/>
+                  </a:solidFill>
+                  <a:latin typeface="Times New Roman" charset="0"/>
+                  <a:ea typeface="ＭＳ Ｐゴシック" charset="0"/>
+                </a:defRPr>
+              </a:lvl7pPr>
+              <a:lvl8pPr marL="3086100" indent="-228600" fontAlgn="base">
+                <a:spcBef>
+                  <a:spcPct val="0"/>
+                </a:spcBef>
+                <a:spcAft>
+                  <a:spcPct val="0"/>
+                </a:spcAft>
+                <a:defRPr sz="2400">
+                  <a:solidFill>
+                    <a:schemeClr val="tx1"/>
+                  </a:solidFill>
+                  <a:latin typeface="Times New Roman" charset="0"/>
+                  <a:ea typeface="ＭＳ Ｐゴシック" charset="0"/>
+                </a:defRPr>
+              </a:lvl8pPr>
+              <a:lvl9pPr marL="3543300" indent="-228600" fontAlgn="base">
+                <a:spcBef>
+                  <a:spcPct val="0"/>
+                </a:spcBef>
+                <a:spcAft>
+                  <a:spcPct val="0"/>
+                </a:spcAft>
+                <a:defRPr sz="2400">
+                  <a:solidFill>
+                    <a:schemeClr val="tx1"/>
+                  </a:solidFill>
+                  <a:latin typeface="Times New Roman" charset="0"/>
+                  <a:ea typeface="ＭＳ Ｐゴシック" charset="0"/>
+                </a:defRPr>
+              </a:lvl9pPr>
+            </a:lstStyle>
+            <a:p>
+              <a:pPr>
+                <a:lnSpc>
+                  <a:spcPct val="95000"/>
+                </a:lnSpc>
+                <a:defRPr/>
+              </a:pPr>
+              <a:r>
+                <a:rPr lang="en-US" sz="1100" dirty="0" smtClean="0">
+                  <a:solidFill>
+                    <a:srgbClr val="000000"/>
+                  </a:solidFill>
+                  <a:latin typeface="Arial" charset="0"/>
+                </a:rPr>
+                <a:t>1.0</a:t>
+              </a:r>
+              <a:endParaRPr lang="en-US" sz="1100" dirty="0" smtClean="0">
+                <a:solidFill>
+                  <a:srgbClr val="000000"/>
+                </a:solidFill>
+                <a:latin typeface="Arial" charset="0"/>
+              </a:endParaRPr>
+            </a:p>
+          </p:txBody>
+        </p:sp>
+        <p:pic>
+          <p:nvPicPr>
+            <p:cNvPr id="16" name="Picture 39"/>
+            <p:cNvPicPr>
+              <a:picLocks noChangeAspect="1" noChangeArrowheads="1"/>
+            </p:cNvPicPr>
+            <p:nvPr/>
+          </p:nvPicPr>
+          <p:blipFill>
+            <a:blip r:embed="rId9" cstate="print"/>
+            <a:srcRect/>
+            <a:stretch>
+              <a:fillRect/>
+            </a:stretch>
+          </p:blipFill>
+          <p:spPr bwMode="auto">
+            <a:xfrm>
+              <a:off x="6635750" y="3255963"/>
+              <a:ext cx="414338" cy="106362"/>
+            </a:xfrm>
+            <a:prstGeom prst="rect">
+              <a:avLst/>
+            </a:prstGeom>
+            <a:noFill/>
+            <a:ln w="9525">
+              <a:noFill/>
+              <a:miter lim="800000"/>
+              <a:headEnd/>
+              <a:tailEnd/>
+            </a:ln>
+          </p:spPr>
+        </p:pic>
+        <p:pic>
+          <p:nvPicPr>
+            <p:cNvPr id="17" name="Picture 40"/>
+            <p:cNvPicPr>
+              <a:picLocks noChangeAspect="1" noChangeArrowheads="1"/>
+            </p:cNvPicPr>
+            <p:nvPr/>
+          </p:nvPicPr>
+          <p:blipFill>
+            <a:blip r:embed="rId5" cstate="print"/>
+            <a:srcRect/>
+            <a:stretch>
+              <a:fillRect/>
+            </a:stretch>
+          </p:blipFill>
+          <p:spPr bwMode="auto">
+            <a:xfrm>
+              <a:off x="7016750" y="3965575"/>
+              <a:ext cx="434975" cy="434975"/>
+            </a:xfrm>
+            <a:prstGeom prst="rect">
+              <a:avLst/>
+            </a:prstGeom>
+            <a:noFill/>
+            <a:ln w="9525">
+              <a:noFill/>
+              <a:miter lim="800000"/>
+              <a:headEnd/>
+              <a:tailEnd/>
+            </a:ln>
+          </p:spPr>
+        </p:pic>
+        <p:sp>
+          <p:nvSpPr>
+            <p:cNvPr id="18" name="Text Box 41"/>
+            <p:cNvSpPr txBox="1">
+              <a:spLocks noChangeArrowheads="1"/>
+            </p:cNvSpPr>
+            <p:nvPr/>
+          </p:nvSpPr>
+          <p:spPr bwMode="auto">
+            <a:xfrm>
+              <a:off x="7097713" y="4099481"/>
+              <a:ext cx="279400" cy="160813"/>
+            </a:xfrm>
+            <a:prstGeom prst="rect">
+              <a:avLst/>
+            </a:prstGeom>
+            <a:noFill/>
+            <a:ln>
+              <a:noFill/>
+            </a:ln>
+            <a:effectLst/>
+            <a:extLst>
+              <a:ext uri="{909E8E84-426E-40dd-AFC4-6F175D3DCCD1}">
+                <a14:hiddenFill xmlns:a14="http://schemas.microsoft.com/office/drawing/2010/main" xmlns="">
+                  <a:solidFill>
+                    <a:schemeClr val="accent1"/>
+                  </a:solidFill>
+                </a14:hiddenFill>
+              </a:ext>
+              <a:ext uri="{91240B29-F687-4f45-9708-019B960494DF}">
+                <a14:hiddenLine xmlns:a14="http://schemas.microsoft.com/office/drawing/2010/main" xmlns="" w="9525">
+                  <a:solidFill>
+                    <a:schemeClr val="tx1"/>
+                  </a:solidFill>
+                  <a:miter lim="800000"/>
+                  <a:headEnd/>
+                  <a:tailEnd/>
+                </a14:hiddenLine>
+              </a:ext>
+              <a:ext uri="{AF507438-7753-43e0-B8FC-AC1667EBCBE1}">
+                <a14:hiddenEffects xmlns:a14="http://schemas.microsoft.com/office/drawing/2010/main" xmlns="">
+                  <a:effectLst>
+                    <a:outerShdw blurRad="63500" dist="38099" dir="2700000" algn="ctr" rotWithShape="0">
+                      <a:schemeClr val="bg2">
+                        <a:alpha val="74998"/>
+                      </a:schemeClr>
+                    </a:outerShdw>
+                  </a:effectLst>
+                </a14:hiddenEffects>
+              </a:ext>
+            </a:extLst>
+          </p:spPr>
+          <p:txBody>
+            <a:bodyPr lIns="0" tIns="0" rIns="0" bIns="0" anchor="ctr">
+              <a:spAutoFit/>
+            </a:bodyPr>
+            <a:lstStyle>
+              <a:lvl1pPr>
+                <a:defRPr sz="2400">
+                  <a:solidFill>
+                    <a:schemeClr val="tx1"/>
+                  </a:solidFill>
+                  <a:latin typeface="Times New Roman" charset="0"/>
+                  <a:ea typeface="ＭＳ Ｐゴシック" charset="0"/>
+                </a:defRPr>
+              </a:lvl1pPr>
+              <a:lvl2pPr indent="-342900">
+                <a:defRPr sz="2400">
+                  <a:solidFill>
+                    <a:schemeClr val="tx1"/>
+                  </a:solidFill>
+                  <a:latin typeface="Times New Roman" charset="0"/>
+                  <a:ea typeface="ＭＳ Ｐゴシック" charset="0"/>
+                </a:defRPr>
+              </a:lvl2pPr>
+              <a:lvl3pPr marL="857250" indent="-285750">
+                <a:defRPr sz="2400">
+                  <a:solidFill>
+                    <a:schemeClr val="tx1"/>
+                  </a:solidFill>
+                  <a:latin typeface="Times New Roman" charset="0"/>
+                  <a:ea typeface="ＭＳ Ｐゴシック" charset="0"/>
+                </a:defRPr>
+              </a:lvl3pPr>
+              <a:lvl4pPr marL="1257300" indent="-228600">
+                <a:defRPr sz="2400">
+                  <a:solidFill>
+                    <a:schemeClr val="tx1"/>
+                  </a:solidFill>
+                  <a:latin typeface="Times New Roman" charset="0"/>
+                  <a:ea typeface="ＭＳ Ｐゴシック" charset="0"/>
+                </a:defRPr>
+              </a:lvl4pPr>
+              <a:lvl5pPr marL="1714500" indent="-228600">
+                <a:defRPr sz="2400">
+                  <a:solidFill>
+                    <a:schemeClr val="tx1"/>
+                  </a:solidFill>
+                  <a:latin typeface="Times New Roman" charset="0"/>
+                  <a:ea typeface="ＭＳ Ｐゴシック" charset="0"/>
+                </a:defRPr>
+              </a:lvl5pPr>
+              <a:lvl6pPr marL="2171700" indent="-228600" fontAlgn="base">
+                <a:spcBef>
+                  <a:spcPct val="0"/>
+                </a:spcBef>
+                <a:spcAft>
+                  <a:spcPct val="0"/>
+                </a:spcAft>
+                <a:defRPr sz="2400">
+                  <a:solidFill>
+                    <a:schemeClr val="tx1"/>
+                  </a:solidFill>
+                  <a:latin typeface="Times New Roman" charset="0"/>
+                  <a:ea typeface="ＭＳ Ｐゴシック" charset="0"/>
+                </a:defRPr>
+              </a:lvl6pPr>
+              <a:lvl7pPr marL="2628900" indent="-228600" fontAlgn="base">
+                <a:spcBef>
+                  <a:spcPct val="0"/>
+                </a:spcBef>
+                <a:spcAft>
+                  <a:spcPct val="0"/>
+                </a:spcAft>
+                <a:defRPr sz="2400">
+                  <a:solidFill>
+                    <a:schemeClr val="tx1"/>
+                  </a:solidFill>
+                  <a:latin typeface="Times New Roman" charset="0"/>
+                  <a:ea typeface="ＭＳ Ｐゴシック" charset="0"/>
+                </a:defRPr>
+              </a:lvl7pPr>
+              <a:lvl8pPr marL="3086100" indent="-228600" fontAlgn="base">
+                <a:spcBef>
+                  <a:spcPct val="0"/>
+                </a:spcBef>
+                <a:spcAft>
+                  <a:spcPct val="0"/>
+                </a:spcAft>
+                <a:defRPr sz="2400">
+                  <a:solidFill>
+                    <a:schemeClr val="tx1"/>
+                  </a:solidFill>
+                  <a:latin typeface="Times New Roman" charset="0"/>
+                  <a:ea typeface="ＭＳ Ｐゴシック" charset="0"/>
+                </a:defRPr>
+              </a:lvl8pPr>
+              <a:lvl9pPr marL="3543300" indent="-228600" fontAlgn="base">
+                <a:spcBef>
+                  <a:spcPct val="0"/>
+                </a:spcBef>
+                <a:spcAft>
+                  <a:spcPct val="0"/>
+                </a:spcAft>
+                <a:defRPr sz="2400">
+                  <a:solidFill>
+                    <a:schemeClr val="tx1"/>
+                  </a:solidFill>
+                  <a:latin typeface="Times New Roman" charset="0"/>
+                  <a:ea typeface="ＭＳ Ｐゴシック" charset="0"/>
+                </a:defRPr>
+              </a:lvl9pPr>
+            </a:lstStyle>
+            <a:p>
+              <a:pPr algn="ctr">
+                <a:lnSpc>
+                  <a:spcPct val="95000"/>
+                </a:lnSpc>
+                <a:defRPr/>
+              </a:pPr>
+              <a:r>
+                <a:rPr lang="en-US" sz="1100" dirty="0" smtClean="0">
+                  <a:solidFill>
+                    <a:srgbClr val="000000"/>
+                  </a:solidFill>
+                  <a:latin typeface="Arial" charset="0"/>
+                </a:rPr>
+                <a:t>D</a:t>
+              </a:r>
+            </a:p>
+          </p:txBody>
+        </p:sp>
+        <p:pic>
+          <p:nvPicPr>
+            <p:cNvPr id="19" name="Picture 42"/>
+            <p:cNvPicPr>
+              <a:picLocks noChangeAspect="1" noChangeArrowheads="1"/>
+            </p:cNvPicPr>
+            <p:nvPr/>
+          </p:nvPicPr>
+          <p:blipFill>
+            <a:blip r:embed="rId10" cstate="print"/>
+            <a:srcRect/>
+            <a:stretch>
+              <a:fillRect/>
+            </a:stretch>
+          </p:blipFill>
+          <p:spPr bwMode="auto">
+            <a:xfrm>
+              <a:off x="7229475" y="4367213"/>
+              <a:ext cx="22225" cy="414337"/>
+            </a:xfrm>
+            <a:prstGeom prst="rect">
+              <a:avLst/>
+            </a:prstGeom>
+            <a:noFill/>
+            <a:ln w="9525">
+              <a:noFill/>
+              <a:miter lim="800000"/>
+              <a:headEnd/>
+              <a:tailEnd/>
+            </a:ln>
+          </p:spPr>
+        </p:pic>
+        <p:pic>
+          <p:nvPicPr>
+            <p:cNvPr id="20" name="Picture 43"/>
+            <p:cNvPicPr>
+              <a:picLocks noChangeAspect="1" noChangeArrowheads="1"/>
+            </p:cNvPicPr>
+            <p:nvPr/>
+          </p:nvPicPr>
+          <p:blipFill>
+            <a:blip r:embed="rId5" cstate="print"/>
+            <a:srcRect/>
+            <a:stretch>
+              <a:fillRect/>
+            </a:stretch>
+          </p:blipFill>
+          <p:spPr bwMode="auto">
+            <a:xfrm>
+              <a:off x="7810500" y="4759325"/>
+              <a:ext cx="434975" cy="434975"/>
+            </a:xfrm>
+            <a:prstGeom prst="rect">
+              <a:avLst/>
+            </a:prstGeom>
+            <a:noFill/>
+            <a:ln w="9525">
+              <a:noFill/>
+              <a:miter lim="800000"/>
+              <a:headEnd/>
+              <a:tailEnd/>
+            </a:ln>
+          </p:spPr>
+        </p:pic>
+        <p:sp>
+          <p:nvSpPr>
+            <p:cNvPr id="21" name="Text Box 44"/>
+            <p:cNvSpPr txBox="1">
+              <a:spLocks noChangeArrowheads="1"/>
+            </p:cNvSpPr>
+            <p:nvPr/>
+          </p:nvSpPr>
+          <p:spPr bwMode="auto">
+            <a:xfrm>
+              <a:off x="7891463" y="4893231"/>
+              <a:ext cx="279400" cy="160813"/>
+            </a:xfrm>
+            <a:prstGeom prst="rect">
+              <a:avLst/>
+            </a:prstGeom>
+            <a:noFill/>
+            <a:ln>
+              <a:noFill/>
+            </a:ln>
+            <a:effectLst/>
+            <a:extLst>
+              <a:ext uri="{909E8E84-426E-40dd-AFC4-6F175D3DCCD1}">
+                <a14:hiddenFill xmlns:a14="http://schemas.microsoft.com/office/drawing/2010/main" xmlns="">
+                  <a:solidFill>
+                    <a:schemeClr val="accent1"/>
+                  </a:solidFill>
+                </a14:hiddenFill>
+              </a:ext>
+              <a:ext uri="{91240B29-F687-4f45-9708-019B960494DF}">
+                <a14:hiddenLine xmlns:a14="http://schemas.microsoft.com/office/drawing/2010/main" xmlns="" w="9525">
+                  <a:solidFill>
+                    <a:schemeClr val="tx1"/>
+                  </a:solidFill>
+                  <a:miter lim="800000"/>
+                  <a:headEnd/>
+                  <a:tailEnd/>
+                </a14:hiddenLine>
+              </a:ext>
+              <a:ext uri="{AF507438-7753-43e0-B8FC-AC1667EBCBE1}">
+                <a14:hiddenEffects xmlns:a14="http://schemas.microsoft.com/office/drawing/2010/main" xmlns="">
+                  <a:effectLst>
+                    <a:outerShdw blurRad="63500" dist="38099" dir="2700000" algn="ctr" rotWithShape="0">
+                      <a:schemeClr val="bg2">
+                        <a:alpha val="74998"/>
+                      </a:schemeClr>
+                    </a:outerShdw>
+                  </a:effectLst>
+                </a14:hiddenEffects>
+              </a:ext>
+            </a:extLst>
+          </p:spPr>
+          <p:txBody>
+            <a:bodyPr lIns="0" tIns="0" rIns="0" bIns="0" anchor="ctr">
+              <a:spAutoFit/>
+            </a:bodyPr>
+            <a:lstStyle>
+              <a:lvl1pPr>
+                <a:defRPr sz="2400">
+                  <a:solidFill>
+                    <a:schemeClr val="tx1"/>
+                  </a:solidFill>
+                  <a:latin typeface="Times New Roman" charset="0"/>
+                  <a:ea typeface="ＭＳ Ｐゴシック" charset="0"/>
+                </a:defRPr>
+              </a:lvl1pPr>
+              <a:lvl2pPr indent="-342900">
+                <a:defRPr sz="2400">
+                  <a:solidFill>
+                    <a:schemeClr val="tx1"/>
+                  </a:solidFill>
+                  <a:latin typeface="Times New Roman" charset="0"/>
+                  <a:ea typeface="ＭＳ Ｐゴシック" charset="0"/>
+                </a:defRPr>
+              </a:lvl2pPr>
+              <a:lvl3pPr marL="857250" indent="-285750">
+                <a:defRPr sz="2400">
+                  <a:solidFill>
+                    <a:schemeClr val="tx1"/>
+                  </a:solidFill>
+                  <a:latin typeface="Times New Roman" charset="0"/>
+                  <a:ea typeface="ＭＳ Ｐゴシック" charset="0"/>
+                </a:defRPr>
+              </a:lvl3pPr>
+              <a:lvl4pPr marL="1257300" indent="-228600">
+                <a:defRPr sz="2400">
+                  <a:solidFill>
+                    <a:schemeClr val="tx1"/>
+                  </a:solidFill>
+                  <a:latin typeface="Times New Roman" charset="0"/>
+                  <a:ea typeface="ＭＳ Ｐゴシック" charset="0"/>
+                </a:defRPr>
+              </a:lvl4pPr>
+              <a:lvl5pPr marL="1714500" indent="-228600">
+                <a:defRPr sz="2400">
+                  <a:solidFill>
+                    <a:schemeClr val="tx1"/>
+                  </a:solidFill>
+                  <a:latin typeface="Times New Roman" charset="0"/>
+                  <a:ea typeface="ＭＳ Ｐゴシック" charset="0"/>
+                </a:defRPr>
+              </a:lvl5pPr>
+              <a:lvl6pPr marL="2171700" indent="-228600" fontAlgn="base">
+                <a:spcBef>
+                  <a:spcPct val="0"/>
+                </a:spcBef>
+                <a:spcAft>
+                  <a:spcPct val="0"/>
+                </a:spcAft>
+                <a:defRPr sz="2400">
+                  <a:solidFill>
+                    <a:schemeClr val="tx1"/>
+                  </a:solidFill>
+                  <a:latin typeface="Times New Roman" charset="0"/>
+                  <a:ea typeface="ＭＳ Ｐゴシック" charset="0"/>
+                </a:defRPr>
+              </a:lvl6pPr>
+              <a:lvl7pPr marL="2628900" indent="-228600" fontAlgn="base">
+                <a:spcBef>
+                  <a:spcPct val="0"/>
+                </a:spcBef>
+                <a:spcAft>
+                  <a:spcPct val="0"/>
+                </a:spcAft>
+                <a:defRPr sz="2400">
+                  <a:solidFill>
+                    <a:schemeClr val="tx1"/>
+                  </a:solidFill>
+                  <a:latin typeface="Times New Roman" charset="0"/>
+                  <a:ea typeface="ＭＳ Ｐゴシック" charset="0"/>
+                </a:defRPr>
+              </a:lvl7pPr>
+              <a:lvl8pPr marL="3086100" indent="-228600" fontAlgn="base">
+                <a:spcBef>
+                  <a:spcPct val="0"/>
+                </a:spcBef>
+                <a:spcAft>
+                  <a:spcPct val="0"/>
+                </a:spcAft>
+                <a:defRPr sz="2400">
+                  <a:solidFill>
+                    <a:schemeClr val="tx1"/>
+                  </a:solidFill>
+                  <a:latin typeface="Times New Roman" charset="0"/>
+                  <a:ea typeface="ＭＳ Ｐゴシック" charset="0"/>
+                </a:defRPr>
+              </a:lvl8pPr>
+              <a:lvl9pPr marL="3543300" indent="-228600" fontAlgn="base">
+                <a:spcBef>
+                  <a:spcPct val="0"/>
+                </a:spcBef>
+                <a:spcAft>
+                  <a:spcPct val="0"/>
+                </a:spcAft>
+                <a:defRPr sz="2400">
+                  <a:solidFill>
+                    <a:schemeClr val="tx1"/>
+                  </a:solidFill>
+                  <a:latin typeface="Times New Roman" charset="0"/>
+                  <a:ea typeface="ＭＳ Ｐゴシック" charset="0"/>
+                </a:defRPr>
+              </a:lvl9pPr>
+            </a:lstStyle>
+            <a:p>
+              <a:pPr algn="ctr">
+                <a:lnSpc>
+                  <a:spcPct val="95000"/>
+                </a:lnSpc>
+                <a:defRPr/>
+              </a:pPr>
+              <a:r>
+                <a:rPr lang="en-US" sz="1100" smtClean="0">
+                  <a:solidFill>
+                    <a:srgbClr val="000000"/>
+                  </a:solidFill>
+                  <a:latin typeface="Arial" charset="0"/>
+                </a:rPr>
+                <a:t>E</a:t>
+              </a:r>
+            </a:p>
+          </p:txBody>
+        </p:sp>
+        <p:pic>
+          <p:nvPicPr>
+            <p:cNvPr id="22" name="Picture 45"/>
+            <p:cNvPicPr>
+              <a:picLocks noChangeAspect="1" noChangeArrowheads="1"/>
+            </p:cNvPicPr>
+            <p:nvPr/>
+          </p:nvPicPr>
+          <p:blipFill>
+            <a:blip r:embed="rId5" cstate="print"/>
+            <a:srcRect/>
+            <a:stretch>
+              <a:fillRect/>
+            </a:stretch>
+          </p:blipFill>
+          <p:spPr bwMode="auto">
+            <a:xfrm>
+              <a:off x="7810500" y="3965575"/>
+              <a:ext cx="434975" cy="434975"/>
+            </a:xfrm>
+            <a:prstGeom prst="rect">
+              <a:avLst/>
+            </a:prstGeom>
+            <a:noFill/>
+            <a:ln w="9525">
+              <a:noFill/>
+              <a:miter lim="800000"/>
+              <a:headEnd/>
+              <a:tailEnd/>
+            </a:ln>
+          </p:spPr>
+        </p:pic>
+        <p:sp>
+          <p:nvSpPr>
+            <p:cNvPr id="23" name="Text Box 46"/>
+            <p:cNvSpPr txBox="1">
+              <a:spLocks noChangeArrowheads="1"/>
+            </p:cNvSpPr>
+            <p:nvPr/>
+          </p:nvSpPr>
+          <p:spPr bwMode="auto">
+            <a:xfrm>
+              <a:off x="7891463" y="4099481"/>
+              <a:ext cx="279400" cy="160813"/>
+            </a:xfrm>
+            <a:prstGeom prst="rect">
+              <a:avLst/>
+            </a:prstGeom>
+            <a:noFill/>
+            <a:ln>
+              <a:noFill/>
+            </a:ln>
+            <a:effectLst/>
+            <a:extLst>
+              <a:ext uri="{909E8E84-426E-40dd-AFC4-6F175D3DCCD1}">
+                <a14:hiddenFill xmlns:a14="http://schemas.microsoft.com/office/drawing/2010/main" xmlns="">
+                  <a:solidFill>
+                    <a:schemeClr val="accent1"/>
+                  </a:solidFill>
+                </a14:hiddenFill>
+              </a:ext>
+              <a:ext uri="{91240B29-F687-4f45-9708-019B960494DF}">
+                <a14:hiddenLine xmlns:a14="http://schemas.microsoft.com/office/drawing/2010/main" xmlns="" w="9525">
+                  <a:solidFill>
+                    <a:schemeClr val="tx1"/>
+                  </a:solidFill>
+                  <a:miter lim="800000"/>
+                  <a:headEnd/>
+                  <a:tailEnd/>
+                </a14:hiddenLine>
+              </a:ext>
+              <a:ext uri="{AF507438-7753-43e0-B8FC-AC1667EBCBE1}">
+                <a14:hiddenEffects xmlns:a14="http://schemas.microsoft.com/office/drawing/2010/main" xmlns="">
+                  <a:effectLst>
+                    <a:outerShdw blurRad="63500" dist="38099" dir="2700000" algn="ctr" rotWithShape="0">
+                      <a:schemeClr val="bg2">
+                        <a:alpha val="74998"/>
+                      </a:schemeClr>
+                    </a:outerShdw>
+                  </a:effectLst>
+                </a14:hiddenEffects>
+              </a:ext>
+            </a:extLst>
+          </p:spPr>
+          <p:txBody>
+            <a:bodyPr lIns="0" tIns="0" rIns="0" bIns="0" anchor="ctr">
+              <a:spAutoFit/>
+            </a:bodyPr>
+            <a:lstStyle>
+              <a:lvl1pPr>
+                <a:defRPr sz="2400">
+                  <a:solidFill>
+                    <a:schemeClr val="tx1"/>
+                  </a:solidFill>
+                  <a:latin typeface="Times New Roman" charset="0"/>
+                  <a:ea typeface="ＭＳ Ｐゴシック" charset="0"/>
+                </a:defRPr>
+              </a:lvl1pPr>
+              <a:lvl2pPr indent="-342900">
+                <a:defRPr sz="2400">
+                  <a:solidFill>
+                    <a:schemeClr val="tx1"/>
+                  </a:solidFill>
+                  <a:latin typeface="Times New Roman" charset="0"/>
+                  <a:ea typeface="ＭＳ Ｐゴシック" charset="0"/>
+                </a:defRPr>
+              </a:lvl2pPr>
+              <a:lvl3pPr marL="857250" indent="-285750">
+                <a:defRPr sz="2400">
+                  <a:solidFill>
+                    <a:schemeClr val="tx1"/>
+                  </a:solidFill>
+                  <a:latin typeface="Times New Roman" charset="0"/>
+                  <a:ea typeface="ＭＳ Ｐゴシック" charset="0"/>
+                </a:defRPr>
+              </a:lvl3pPr>
+              <a:lvl4pPr marL="1257300" indent="-228600">
+                <a:defRPr sz="2400">
+                  <a:solidFill>
+                    <a:schemeClr val="tx1"/>
+                  </a:solidFill>
+                  <a:latin typeface="Times New Roman" charset="0"/>
+                  <a:ea typeface="ＭＳ Ｐゴシック" charset="0"/>
+                </a:defRPr>
+              </a:lvl4pPr>
+              <a:lvl5pPr marL="1714500" indent="-228600">
+                <a:defRPr sz="2400">
+                  <a:solidFill>
+                    <a:schemeClr val="tx1"/>
+                  </a:solidFill>
+                  <a:latin typeface="Times New Roman" charset="0"/>
+                  <a:ea typeface="ＭＳ Ｐゴシック" charset="0"/>
+                </a:defRPr>
+              </a:lvl5pPr>
+              <a:lvl6pPr marL="2171700" indent="-228600" fontAlgn="base">
+                <a:spcBef>
+                  <a:spcPct val="0"/>
+                </a:spcBef>
+                <a:spcAft>
+                  <a:spcPct val="0"/>
+                </a:spcAft>
+                <a:defRPr sz="2400">
+                  <a:solidFill>
+                    <a:schemeClr val="tx1"/>
+                  </a:solidFill>
+                  <a:latin typeface="Times New Roman" charset="0"/>
+                  <a:ea typeface="ＭＳ Ｐゴシック" charset="0"/>
+                </a:defRPr>
+              </a:lvl6pPr>
+              <a:lvl7pPr marL="2628900" indent="-228600" fontAlgn="base">
+                <a:spcBef>
+                  <a:spcPct val="0"/>
+                </a:spcBef>
+                <a:spcAft>
+                  <a:spcPct val="0"/>
+                </a:spcAft>
+                <a:defRPr sz="2400">
+                  <a:solidFill>
+                    <a:schemeClr val="tx1"/>
+                  </a:solidFill>
+                  <a:latin typeface="Times New Roman" charset="0"/>
+                  <a:ea typeface="ＭＳ Ｐゴシック" charset="0"/>
+                </a:defRPr>
+              </a:lvl7pPr>
+              <a:lvl8pPr marL="3086100" indent="-228600" fontAlgn="base">
+                <a:spcBef>
+                  <a:spcPct val="0"/>
+                </a:spcBef>
+                <a:spcAft>
+                  <a:spcPct val="0"/>
+                </a:spcAft>
+                <a:defRPr sz="2400">
+                  <a:solidFill>
+                    <a:schemeClr val="tx1"/>
+                  </a:solidFill>
+                  <a:latin typeface="Times New Roman" charset="0"/>
+                  <a:ea typeface="ＭＳ Ｐゴシック" charset="0"/>
+                </a:defRPr>
+              </a:lvl8pPr>
+              <a:lvl9pPr marL="3543300" indent="-228600" fontAlgn="base">
+                <a:spcBef>
+                  <a:spcPct val="0"/>
+                </a:spcBef>
+                <a:spcAft>
+                  <a:spcPct val="0"/>
+                </a:spcAft>
+                <a:defRPr sz="2400">
+                  <a:solidFill>
+                    <a:schemeClr val="tx1"/>
+                  </a:solidFill>
+                  <a:latin typeface="Times New Roman" charset="0"/>
+                  <a:ea typeface="ＭＳ Ｐゴシック" charset="0"/>
+                </a:defRPr>
+              </a:lvl9pPr>
+            </a:lstStyle>
+            <a:p>
+              <a:pPr algn="ctr">
+                <a:lnSpc>
+                  <a:spcPct val="95000"/>
+                </a:lnSpc>
+                <a:defRPr/>
+              </a:pPr>
+              <a:r>
+                <a:rPr lang="en-US" sz="1100" smtClean="0">
+                  <a:solidFill>
+                    <a:srgbClr val="000000"/>
+                  </a:solidFill>
+                  <a:latin typeface="Arial" charset="0"/>
+                </a:rPr>
+                <a:t>F</a:t>
+              </a:r>
+            </a:p>
+          </p:txBody>
+        </p:sp>
+        <p:pic>
+          <p:nvPicPr>
+            <p:cNvPr id="24" name="Picture 47"/>
+            <p:cNvPicPr>
+              <a:picLocks noChangeAspect="1" noChangeArrowheads="1"/>
+            </p:cNvPicPr>
+            <p:nvPr/>
+          </p:nvPicPr>
+          <p:blipFill>
+            <a:blip r:embed="rId11" cstate="print"/>
+            <a:srcRect/>
+            <a:stretch>
+              <a:fillRect/>
+            </a:stretch>
+          </p:blipFill>
+          <p:spPr bwMode="auto">
+            <a:xfrm>
+              <a:off x="7366000" y="5108575"/>
+              <a:ext cx="530225" cy="603250"/>
+            </a:xfrm>
+            <a:prstGeom prst="rect">
+              <a:avLst/>
+            </a:prstGeom>
+            <a:noFill/>
+            <a:ln w="9525">
+              <a:noFill/>
+              <a:miter lim="800000"/>
+              <a:headEnd/>
+              <a:tailEnd/>
+            </a:ln>
+          </p:spPr>
+        </p:pic>
+        <p:pic>
+          <p:nvPicPr>
+            <p:cNvPr id="25" name="Picture 48"/>
+            <p:cNvPicPr>
+              <a:picLocks noChangeAspect="1" noChangeArrowheads="1"/>
+            </p:cNvPicPr>
+            <p:nvPr/>
+          </p:nvPicPr>
+          <p:blipFill>
+            <a:blip r:embed="rId10" cstate="print"/>
+            <a:srcRect/>
+            <a:stretch>
+              <a:fillRect/>
+            </a:stretch>
+          </p:blipFill>
+          <p:spPr bwMode="auto">
+            <a:xfrm>
+              <a:off x="8023225" y="4367213"/>
+              <a:ext cx="22225" cy="414337"/>
+            </a:xfrm>
+            <a:prstGeom prst="rect">
+              <a:avLst/>
+            </a:prstGeom>
+            <a:noFill/>
+            <a:ln w="9525">
+              <a:noFill/>
+              <a:miter lim="800000"/>
+              <a:headEnd/>
+              <a:tailEnd/>
+            </a:ln>
+          </p:spPr>
+        </p:pic>
+        <p:pic>
+          <p:nvPicPr>
+            <p:cNvPr id="26" name="Picture 49"/>
+            <p:cNvPicPr>
+              <a:picLocks noChangeAspect="1" noChangeArrowheads="1"/>
+            </p:cNvPicPr>
+            <p:nvPr/>
+          </p:nvPicPr>
+          <p:blipFill>
+            <a:blip r:embed="rId12" cstate="print"/>
+            <a:srcRect/>
+            <a:stretch>
+              <a:fillRect/>
+            </a:stretch>
+          </p:blipFill>
+          <p:spPr bwMode="auto">
+            <a:xfrm>
+              <a:off x="4805363" y="3097213"/>
+              <a:ext cx="815975" cy="434975"/>
+            </a:xfrm>
+            <a:prstGeom prst="rect">
+              <a:avLst/>
+            </a:prstGeom>
+            <a:noFill/>
+            <a:ln w="9525">
+              <a:noFill/>
+              <a:miter lim="800000"/>
+              <a:headEnd/>
+              <a:tailEnd/>
+            </a:ln>
+          </p:spPr>
+        </p:pic>
+        <p:sp>
+          <p:nvSpPr>
+            <p:cNvPr id="27" name="Text Box 50"/>
+            <p:cNvSpPr txBox="1">
+              <a:spLocks noChangeArrowheads="1"/>
+            </p:cNvSpPr>
+            <p:nvPr/>
+          </p:nvSpPr>
+          <p:spPr bwMode="auto">
+            <a:xfrm>
+              <a:off x="4864099" y="3226253"/>
+              <a:ext cx="774701" cy="160813"/>
+            </a:xfrm>
+            <a:prstGeom prst="rect">
+              <a:avLst/>
+            </a:prstGeom>
+            <a:noFill/>
+            <a:ln>
+              <a:noFill/>
+            </a:ln>
+            <a:effectLst/>
+            <a:extLst>
+              <a:ext uri="{909E8E84-426E-40dd-AFC4-6F175D3DCCD1}">
+                <a14:hiddenFill xmlns:a14="http://schemas.microsoft.com/office/drawing/2010/main" xmlns="">
+                  <a:solidFill>
+                    <a:schemeClr val="accent1"/>
+                  </a:solidFill>
+                </a14:hiddenFill>
+              </a:ext>
+              <a:ext uri="{91240B29-F687-4f45-9708-019B960494DF}">
+                <a14:hiddenLine xmlns:a14="http://schemas.microsoft.com/office/drawing/2010/main" xmlns="" w="9525">
+                  <a:solidFill>
+                    <a:schemeClr val="tx1"/>
+                  </a:solidFill>
+                  <a:miter lim="800000"/>
+                  <a:headEnd/>
+                  <a:tailEnd/>
+                </a14:hiddenLine>
+              </a:ext>
+              <a:ext uri="{AF507438-7753-43e0-B8FC-AC1667EBCBE1}">
+                <a14:hiddenEffects xmlns:a14="http://schemas.microsoft.com/office/drawing/2010/main" xmlns="">
+                  <a:effectLst>
+                    <a:outerShdw blurRad="63500" dist="38099" dir="2700000" algn="ctr" rotWithShape="0">
+                      <a:schemeClr val="bg2">
+                        <a:alpha val="74998"/>
+                      </a:schemeClr>
+                    </a:outerShdw>
+                  </a:effectLst>
+                </a14:hiddenEffects>
+              </a:ext>
+            </a:extLst>
+          </p:spPr>
+          <p:txBody>
+            <a:bodyPr lIns="0" tIns="0" rIns="0" bIns="0">
+              <a:spAutoFit/>
+            </a:bodyPr>
+            <a:lstStyle>
+              <a:lvl1pPr>
+                <a:defRPr sz="2400">
+                  <a:solidFill>
+                    <a:schemeClr val="tx1"/>
+                  </a:solidFill>
+                  <a:latin typeface="Times New Roman" charset="0"/>
+                  <a:ea typeface="ＭＳ Ｐゴシック" charset="0"/>
+                </a:defRPr>
+              </a:lvl1pPr>
+              <a:lvl2pPr indent="-342900">
+                <a:defRPr sz="2400">
+                  <a:solidFill>
+                    <a:schemeClr val="tx1"/>
+                  </a:solidFill>
+                  <a:latin typeface="Times New Roman" charset="0"/>
+                  <a:ea typeface="ＭＳ Ｐゴシック" charset="0"/>
+                </a:defRPr>
+              </a:lvl2pPr>
+              <a:lvl3pPr marL="857250" indent="-285750">
+                <a:defRPr sz="2400">
+                  <a:solidFill>
+                    <a:schemeClr val="tx1"/>
+                  </a:solidFill>
+                  <a:latin typeface="Times New Roman" charset="0"/>
+                  <a:ea typeface="ＭＳ Ｐゴシック" charset="0"/>
+                </a:defRPr>
+              </a:lvl3pPr>
+              <a:lvl4pPr marL="1257300" indent="-228600">
+                <a:defRPr sz="2400">
+                  <a:solidFill>
+                    <a:schemeClr val="tx1"/>
+                  </a:solidFill>
+                  <a:latin typeface="Times New Roman" charset="0"/>
+                  <a:ea typeface="ＭＳ Ｐゴシック" charset="0"/>
+                </a:defRPr>
+              </a:lvl4pPr>
+              <a:lvl5pPr marL="1714500" indent="-228600">
+                <a:defRPr sz="2400">
+                  <a:solidFill>
+                    <a:schemeClr val="tx1"/>
+                  </a:solidFill>
+                  <a:latin typeface="Times New Roman" charset="0"/>
+                  <a:ea typeface="ＭＳ Ｐゴシック" charset="0"/>
+                </a:defRPr>
+              </a:lvl5pPr>
+              <a:lvl6pPr marL="2171700" indent="-228600" fontAlgn="base">
+                <a:spcBef>
+                  <a:spcPct val="0"/>
+                </a:spcBef>
+                <a:spcAft>
+                  <a:spcPct val="0"/>
+                </a:spcAft>
+                <a:defRPr sz="2400">
+                  <a:solidFill>
+                    <a:schemeClr val="tx1"/>
+                  </a:solidFill>
+                  <a:latin typeface="Times New Roman" charset="0"/>
+                  <a:ea typeface="ＭＳ Ｐゴシック" charset="0"/>
+                </a:defRPr>
+              </a:lvl6pPr>
+              <a:lvl7pPr marL="2628900" indent="-228600" fontAlgn="base">
+                <a:spcBef>
+                  <a:spcPct val="0"/>
+                </a:spcBef>
+                <a:spcAft>
+                  <a:spcPct val="0"/>
+                </a:spcAft>
+                <a:defRPr sz="2400">
+                  <a:solidFill>
+                    <a:schemeClr val="tx1"/>
+                  </a:solidFill>
+                  <a:latin typeface="Times New Roman" charset="0"/>
+                  <a:ea typeface="ＭＳ Ｐゴシック" charset="0"/>
+                </a:defRPr>
+              </a:lvl7pPr>
+              <a:lvl8pPr marL="3086100" indent="-228600" fontAlgn="base">
+                <a:spcBef>
+                  <a:spcPct val="0"/>
+                </a:spcBef>
+                <a:spcAft>
+                  <a:spcPct val="0"/>
+                </a:spcAft>
+                <a:defRPr sz="2400">
+                  <a:solidFill>
+                    <a:schemeClr val="tx1"/>
+                  </a:solidFill>
+                  <a:latin typeface="Times New Roman" charset="0"/>
+                  <a:ea typeface="ＭＳ Ｐゴシック" charset="0"/>
+                </a:defRPr>
+              </a:lvl8pPr>
+              <a:lvl9pPr marL="3543300" indent="-228600" fontAlgn="base">
+                <a:spcBef>
+                  <a:spcPct val="0"/>
+                </a:spcBef>
+                <a:spcAft>
+                  <a:spcPct val="0"/>
+                </a:spcAft>
+                <a:defRPr sz="2400">
+                  <a:solidFill>
+                    <a:schemeClr val="tx1"/>
+                  </a:solidFill>
+                  <a:latin typeface="Times New Roman" charset="0"/>
+                  <a:ea typeface="ＭＳ Ｐゴシック" charset="0"/>
+                </a:defRPr>
+              </a:lvl9pPr>
+            </a:lstStyle>
+            <a:p>
+              <a:pPr>
+                <a:lnSpc>
+                  <a:spcPct val="95000"/>
+                </a:lnSpc>
+                <a:defRPr/>
+              </a:pPr>
+              <a:r>
+                <a:rPr lang="en-US" sz="1100" dirty="0" smtClean="0">
+                  <a:solidFill>
+                    <a:srgbClr val="000000"/>
+                  </a:solidFill>
+                  <a:latin typeface="Arial" charset="0"/>
+                </a:rPr>
+                <a:t>HEAD</a:t>
+              </a:r>
+            </a:p>
+          </p:txBody>
+        </p:sp>
+        <p:pic>
+          <p:nvPicPr>
+            <p:cNvPr id="28" name="Picture 51"/>
+            <p:cNvPicPr>
+              <a:picLocks noChangeAspect="1" noChangeArrowheads="1"/>
+            </p:cNvPicPr>
+            <p:nvPr/>
+          </p:nvPicPr>
+          <p:blipFill>
+            <a:blip r:embed="rId13" cstate="print"/>
+            <a:srcRect/>
+            <a:stretch>
+              <a:fillRect/>
+            </a:stretch>
+          </p:blipFill>
+          <p:spPr bwMode="auto">
+            <a:xfrm>
+              <a:off x="5599113" y="3255963"/>
+              <a:ext cx="498475" cy="106362"/>
+            </a:xfrm>
+            <a:prstGeom prst="rect">
+              <a:avLst/>
+            </a:prstGeom>
+            <a:noFill/>
+            <a:ln w="9525">
+              <a:noFill/>
+              <a:miter lim="800000"/>
+              <a:headEnd/>
+              <a:tailEnd/>
+            </a:ln>
+          </p:spPr>
+        </p:pic>
+        <p:pic>
+          <p:nvPicPr>
+            <p:cNvPr id="29" name="Picture 52"/>
+            <p:cNvPicPr>
+              <a:picLocks noChangeAspect="1" noChangeArrowheads="1"/>
+            </p:cNvPicPr>
+            <p:nvPr/>
+          </p:nvPicPr>
+          <p:blipFill>
+            <a:blip r:embed="rId14" cstate="print"/>
+            <a:srcRect/>
+            <a:stretch>
+              <a:fillRect/>
+            </a:stretch>
+          </p:blipFill>
+          <p:spPr bwMode="auto">
+            <a:xfrm>
+              <a:off x="8699500" y="3975100"/>
+              <a:ext cx="1208088" cy="425450"/>
+            </a:xfrm>
+            <a:prstGeom prst="rect">
+              <a:avLst/>
+            </a:prstGeom>
+            <a:noFill/>
+            <a:ln w="9525">
+              <a:noFill/>
+              <a:miter lim="800000"/>
+              <a:headEnd/>
+              <a:tailEnd/>
+            </a:ln>
+          </p:spPr>
+        </p:pic>
+        <p:sp>
+          <p:nvSpPr>
+            <p:cNvPr id="30" name="Text Box 53"/>
+            <p:cNvSpPr txBox="1">
+              <a:spLocks noChangeArrowheads="1"/>
+            </p:cNvSpPr>
+            <p:nvPr/>
+          </p:nvSpPr>
+          <p:spPr bwMode="auto">
+            <a:xfrm>
+              <a:off x="8755064" y="4062592"/>
+              <a:ext cx="1092200" cy="229445"/>
+            </a:xfrm>
+            <a:prstGeom prst="rect">
+              <a:avLst/>
+            </a:prstGeom>
+            <a:noFill/>
+            <a:ln>
+              <a:noFill/>
+            </a:ln>
+            <a:effectLst/>
+            <a:extLst>
+              <a:ext uri="{909E8E84-426E-40dd-AFC4-6F175D3DCCD1}">
+                <a14:hiddenFill xmlns:a14="http://schemas.microsoft.com/office/drawing/2010/main" xmlns="">
+                  <a:solidFill>
+                    <a:schemeClr val="accent1"/>
+                  </a:solidFill>
+                </a14:hiddenFill>
+              </a:ext>
+              <a:ext uri="{91240B29-F687-4f45-9708-019B960494DF}">
+                <a14:hiddenLine xmlns:a14="http://schemas.microsoft.com/office/drawing/2010/main" xmlns="" w="9525">
+                  <a:solidFill>
+                    <a:schemeClr val="tx1"/>
+                  </a:solidFill>
+                  <a:miter lim="800000"/>
+                  <a:headEnd/>
+                  <a:tailEnd/>
+                </a14:hiddenLine>
+              </a:ext>
+              <a:ext uri="{AF507438-7753-43e0-B8FC-AC1667EBCBE1}">
+                <a14:hiddenEffects xmlns:a14="http://schemas.microsoft.com/office/drawing/2010/main" xmlns="">
+                  <a:effectLst>
+                    <a:outerShdw blurRad="63500" dist="38099" dir="2700000" algn="ctr" rotWithShape="0">
+                      <a:schemeClr val="bg2">
+                        <a:alpha val="74998"/>
+                      </a:schemeClr>
+                    </a:outerShdw>
+                  </a:effectLst>
+                </a14:hiddenEffects>
+              </a:ext>
+            </a:extLst>
+          </p:spPr>
+          <p:txBody>
+            <a:bodyPr wrap="square" lIns="0" tIns="0" rIns="0" bIns="0">
+              <a:spAutoFit/>
+            </a:bodyPr>
+            <a:lstStyle>
+              <a:lvl1pPr>
+                <a:defRPr sz="2400">
+                  <a:solidFill>
+                    <a:schemeClr val="tx1"/>
+                  </a:solidFill>
+                  <a:latin typeface="Times New Roman" charset="0"/>
+                  <a:ea typeface="ＭＳ Ｐゴシック" charset="0"/>
+                </a:defRPr>
+              </a:lvl1pPr>
+              <a:lvl2pPr indent="-342900">
+                <a:defRPr sz="2400">
+                  <a:solidFill>
+                    <a:schemeClr val="tx1"/>
+                  </a:solidFill>
+                  <a:latin typeface="Times New Roman" charset="0"/>
+                  <a:ea typeface="ＭＳ Ｐゴシック" charset="0"/>
+                </a:defRPr>
+              </a:lvl2pPr>
+              <a:lvl3pPr marL="857250" indent="-285750">
+                <a:defRPr sz="2400">
+                  <a:solidFill>
+                    <a:schemeClr val="tx1"/>
+                  </a:solidFill>
+                  <a:latin typeface="Times New Roman" charset="0"/>
+                  <a:ea typeface="ＭＳ Ｐゴシック" charset="0"/>
+                </a:defRPr>
+              </a:lvl3pPr>
+              <a:lvl4pPr marL="1257300" indent="-228600">
+                <a:defRPr sz="2400">
+                  <a:solidFill>
+                    <a:schemeClr val="tx1"/>
+                  </a:solidFill>
+                  <a:latin typeface="Times New Roman" charset="0"/>
+                  <a:ea typeface="ＭＳ Ｐゴシック" charset="0"/>
+                </a:defRPr>
+              </a:lvl4pPr>
+              <a:lvl5pPr marL="1714500" indent="-228600">
+                <a:defRPr sz="2400">
+                  <a:solidFill>
+                    <a:schemeClr val="tx1"/>
+                  </a:solidFill>
+                  <a:latin typeface="Times New Roman" charset="0"/>
+                  <a:ea typeface="ＭＳ Ｐゴシック" charset="0"/>
+                </a:defRPr>
+              </a:lvl5pPr>
+              <a:lvl6pPr marL="2171700" indent="-228600" fontAlgn="base">
+                <a:spcBef>
+                  <a:spcPct val="0"/>
+                </a:spcBef>
+                <a:spcAft>
+                  <a:spcPct val="0"/>
+                </a:spcAft>
+                <a:defRPr sz="2400">
+                  <a:solidFill>
+                    <a:schemeClr val="tx1"/>
+                  </a:solidFill>
+                  <a:latin typeface="Times New Roman" charset="0"/>
+                  <a:ea typeface="ＭＳ Ｐゴシック" charset="0"/>
+                </a:defRPr>
+              </a:lvl6pPr>
+              <a:lvl7pPr marL="2628900" indent="-228600" fontAlgn="base">
+                <a:spcBef>
+                  <a:spcPct val="0"/>
+                </a:spcBef>
+                <a:spcAft>
+                  <a:spcPct val="0"/>
+                </a:spcAft>
+                <a:defRPr sz="2400">
+                  <a:solidFill>
+                    <a:schemeClr val="tx1"/>
+                  </a:solidFill>
+                  <a:latin typeface="Times New Roman" charset="0"/>
+                  <a:ea typeface="ＭＳ Ｐゴシック" charset="0"/>
+                </a:defRPr>
+              </a:lvl7pPr>
+              <a:lvl8pPr marL="3086100" indent="-228600" fontAlgn="base">
+                <a:spcBef>
+                  <a:spcPct val="0"/>
+                </a:spcBef>
+                <a:spcAft>
+                  <a:spcPct val="0"/>
+                </a:spcAft>
+                <a:defRPr sz="2400">
+                  <a:solidFill>
+                    <a:schemeClr val="tx1"/>
+                  </a:solidFill>
+                  <a:latin typeface="Times New Roman" charset="0"/>
+                  <a:ea typeface="ＭＳ Ｐゴシック" charset="0"/>
+                </a:defRPr>
+              </a:lvl8pPr>
+              <a:lvl9pPr marL="3543300" indent="-228600" fontAlgn="base">
+                <a:spcBef>
+                  <a:spcPct val="0"/>
+                </a:spcBef>
+                <a:spcAft>
+                  <a:spcPct val="0"/>
+                </a:spcAft>
+                <a:defRPr sz="2400">
+                  <a:solidFill>
+                    <a:schemeClr val="tx1"/>
+                  </a:solidFill>
+                  <a:latin typeface="Times New Roman" charset="0"/>
+                  <a:ea typeface="ＭＳ Ｐゴシック" charset="0"/>
+                </a:defRPr>
+              </a:lvl9pPr>
+            </a:lstStyle>
+            <a:p>
+              <a:pPr>
+                <a:lnSpc>
+                  <a:spcPct val="95000"/>
+                </a:lnSpc>
+                <a:defRPr/>
+              </a:pPr>
+              <a:r>
+                <a:rPr lang="en-US" sz="1100" dirty="0" smtClean="0">
+                  <a:solidFill>
+                    <a:srgbClr val="000000"/>
+                  </a:solidFill>
+                  <a:latin typeface="Arial" charset="0"/>
+                </a:rPr>
+                <a:t>feature-1</a:t>
+              </a:r>
+            </a:p>
+          </p:txBody>
+        </p:sp>
+        <p:pic>
+          <p:nvPicPr>
+            <p:cNvPr id="31" name="Picture 54"/>
+            <p:cNvPicPr>
+              <a:picLocks noChangeAspect="1" noChangeArrowheads="1"/>
+            </p:cNvPicPr>
+            <p:nvPr/>
+          </p:nvPicPr>
+          <p:blipFill>
+            <a:blip r:embed="rId15" cstate="print"/>
+            <a:srcRect/>
+            <a:stretch>
+              <a:fillRect/>
+            </a:stretch>
+          </p:blipFill>
+          <p:spPr bwMode="auto">
+            <a:xfrm>
+              <a:off x="8223250" y="4124325"/>
+              <a:ext cx="488950" cy="106363"/>
+            </a:xfrm>
+            <a:prstGeom prst="rect">
+              <a:avLst/>
+            </a:prstGeom>
+            <a:noFill/>
+            <a:ln w="9525">
+              <a:noFill/>
+              <a:miter lim="800000"/>
+              <a:headEnd/>
+              <a:tailEnd/>
+            </a:ln>
+          </p:spPr>
+        </p:pic>
+        <p:pic>
+          <p:nvPicPr>
+            <p:cNvPr id="32" name="Picture 55"/>
+            <p:cNvPicPr>
+              <a:picLocks noChangeAspect="1" noChangeArrowheads="1"/>
+            </p:cNvPicPr>
+            <p:nvPr/>
+          </p:nvPicPr>
+          <p:blipFill>
+            <a:blip r:embed="rId4" cstate="print"/>
+            <a:srcRect/>
+            <a:stretch>
+              <a:fillRect/>
+            </a:stretch>
+          </p:blipFill>
+          <p:spPr bwMode="auto">
+            <a:xfrm>
+              <a:off x="7016750" y="3086100"/>
+              <a:ext cx="434975" cy="436563"/>
+            </a:xfrm>
+            <a:prstGeom prst="rect">
+              <a:avLst/>
+            </a:prstGeom>
+            <a:noFill/>
+            <a:ln w="9525">
+              <a:noFill/>
+              <a:miter lim="800000"/>
+              <a:headEnd/>
+              <a:tailEnd/>
+            </a:ln>
+          </p:spPr>
+        </p:pic>
+        <p:sp>
+          <p:nvSpPr>
+            <p:cNvPr id="33" name="Text Box 56"/>
+            <p:cNvSpPr txBox="1">
+              <a:spLocks noChangeArrowheads="1"/>
+            </p:cNvSpPr>
+            <p:nvPr/>
+          </p:nvSpPr>
+          <p:spPr bwMode="auto">
+            <a:xfrm>
+              <a:off x="7097713" y="3226356"/>
+              <a:ext cx="279400" cy="160813"/>
+            </a:xfrm>
+            <a:prstGeom prst="rect">
+              <a:avLst/>
+            </a:prstGeom>
+            <a:noFill/>
+            <a:ln>
+              <a:noFill/>
+            </a:ln>
+            <a:effectLst/>
+            <a:extLst>
+              <a:ext uri="{909E8E84-426E-40dd-AFC4-6F175D3DCCD1}">
+                <a14:hiddenFill xmlns:a14="http://schemas.microsoft.com/office/drawing/2010/main" xmlns="">
+                  <a:solidFill>
+                    <a:schemeClr val="accent1"/>
+                  </a:solidFill>
+                </a14:hiddenFill>
+              </a:ext>
+              <a:ext uri="{91240B29-F687-4f45-9708-019B960494DF}">
+                <a14:hiddenLine xmlns:a14="http://schemas.microsoft.com/office/drawing/2010/main" xmlns="" w="9525">
+                  <a:solidFill>
+                    <a:schemeClr val="tx1"/>
+                  </a:solidFill>
+                  <a:miter lim="800000"/>
+                  <a:headEnd/>
+                  <a:tailEnd/>
+                </a14:hiddenLine>
+              </a:ext>
+              <a:ext uri="{AF507438-7753-43e0-B8FC-AC1667EBCBE1}">
+                <a14:hiddenEffects xmlns:a14="http://schemas.microsoft.com/office/drawing/2010/main" xmlns="">
+                  <a:effectLst>
+                    <a:outerShdw blurRad="63500" dist="38099" dir="2700000" algn="ctr" rotWithShape="0">
+                      <a:schemeClr val="bg2">
+                        <a:alpha val="74998"/>
+                      </a:schemeClr>
+                    </a:outerShdw>
+                  </a:effectLst>
+                </a14:hiddenEffects>
+              </a:ext>
+            </a:extLst>
+          </p:spPr>
+          <p:txBody>
+            <a:bodyPr lIns="0" tIns="0" rIns="0" bIns="0" anchor="ctr">
+              <a:spAutoFit/>
+            </a:bodyPr>
+            <a:lstStyle>
+              <a:lvl1pPr>
+                <a:defRPr sz="2400">
+                  <a:solidFill>
+                    <a:schemeClr val="tx1"/>
+                  </a:solidFill>
+                  <a:latin typeface="Times New Roman" charset="0"/>
+                  <a:ea typeface="ＭＳ Ｐゴシック" charset="0"/>
+                </a:defRPr>
+              </a:lvl1pPr>
+              <a:lvl2pPr indent="-342900">
+                <a:defRPr sz="2400">
+                  <a:solidFill>
+                    <a:schemeClr val="tx1"/>
+                  </a:solidFill>
+                  <a:latin typeface="Times New Roman" charset="0"/>
+                  <a:ea typeface="ＭＳ Ｐゴシック" charset="0"/>
+                </a:defRPr>
+              </a:lvl2pPr>
+              <a:lvl3pPr marL="857250" indent="-285750">
+                <a:defRPr sz="2400">
+                  <a:solidFill>
+                    <a:schemeClr val="tx1"/>
+                  </a:solidFill>
+                  <a:latin typeface="Times New Roman" charset="0"/>
+                  <a:ea typeface="ＭＳ Ｐゴシック" charset="0"/>
+                </a:defRPr>
+              </a:lvl3pPr>
+              <a:lvl4pPr marL="1257300" indent="-228600">
+                <a:defRPr sz="2400">
+                  <a:solidFill>
+                    <a:schemeClr val="tx1"/>
+                  </a:solidFill>
+                  <a:latin typeface="Times New Roman" charset="0"/>
+                  <a:ea typeface="ＭＳ Ｐゴシック" charset="0"/>
+                </a:defRPr>
+              </a:lvl4pPr>
+              <a:lvl5pPr marL="1714500" indent="-228600">
+                <a:defRPr sz="2400">
+                  <a:solidFill>
+                    <a:schemeClr val="tx1"/>
+                  </a:solidFill>
+                  <a:latin typeface="Times New Roman" charset="0"/>
+                  <a:ea typeface="ＭＳ Ｐゴシック" charset="0"/>
+                </a:defRPr>
+              </a:lvl5pPr>
+              <a:lvl6pPr marL="2171700" indent="-228600" fontAlgn="base">
+                <a:spcBef>
+                  <a:spcPct val="0"/>
+                </a:spcBef>
+                <a:spcAft>
+                  <a:spcPct val="0"/>
+                </a:spcAft>
+                <a:defRPr sz="2400">
+                  <a:solidFill>
+                    <a:schemeClr val="tx1"/>
+                  </a:solidFill>
+                  <a:latin typeface="Times New Roman" charset="0"/>
+                  <a:ea typeface="ＭＳ Ｐゴシック" charset="0"/>
+                </a:defRPr>
+              </a:lvl6pPr>
+              <a:lvl7pPr marL="2628900" indent="-228600" fontAlgn="base">
+                <a:spcBef>
+                  <a:spcPct val="0"/>
+                </a:spcBef>
+                <a:spcAft>
+                  <a:spcPct val="0"/>
+                </a:spcAft>
+                <a:defRPr sz="2400">
+                  <a:solidFill>
+                    <a:schemeClr val="tx1"/>
+                  </a:solidFill>
+                  <a:latin typeface="Times New Roman" charset="0"/>
+                  <a:ea typeface="ＭＳ Ｐゴシック" charset="0"/>
+                </a:defRPr>
+              </a:lvl7pPr>
+              <a:lvl8pPr marL="3086100" indent="-228600" fontAlgn="base">
+                <a:spcBef>
+                  <a:spcPct val="0"/>
+                </a:spcBef>
+                <a:spcAft>
+                  <a:spcPct val="0"/>
+                </a:spcAft>
+                <a:defRPr sz="2400">
+                  <a:solidFill>
+                    <a:schemeClr val="tx1"/>
+                  </a:solidFill>
+                  <a:latin typeface="Times New Roman" charset="0"/>
+                  <a:ea typeface="ＭＳ Ｐゴシック" charset="0"/>
+                </a:defRPr>
+              </a:lvl8pPr>
+              <a:lvl9pPr marL="3543300" indent="-228600" fontAlgn="base">
+                <a:spcBef>
+                  <a:spcPct val="0"/>
+                </a:spcBef>
+                <a:spcAft>
+                  <a:spcPct val="0"/>
+                </a:spcAft>
+                <a:defRPr sz="2400">
+                  <a:solidFill>
+                    <a:schemeClr val="tx1"/>
+                  </a:solidFill>
+                  <a:latin typeface="Times New Roman" charset="0"/>
+                  <a:ea typeface="ＭＳ Ｐゴシック" charset="0"/>
+                </a:defRPr>
+              </a:lvl9pPr>
+            </a:lstStyle>
+            <a:p>
+              <a:pPr algn="ctr">
+                <a:lnSpc>
+                  <a:spcPct val="95000"/>
+                </a:lnSpc>
+                <a:defRPr/>
+              </a:pPr>
+              <a:r>
+                <a:rPr lang="en-US" sz="1100" smtClean="0">
+                  <a:solidFill>
+                    <a:srgbClr val="000000"/>
+                  </a:solidFill>
+                  <a:latin typeface="Arial" charset="0"/>
+                </a:rPr>
+                <a:t>G</a:t>
+              </a:r>
+            </a:p>
+          </p:txBody>
+        </p:sp>
+        <p:pic>
+          <p:nvPicPr>
+            <p:cNvPr id="34" name="Picture 57"/>
+            <p:cNvPicPr>
+              <a:picLocks noChangeAspect="1" noChangeArrowheads="1"/>
+            </p:cNvPicPr>
+            <p:nvPr/>
+          </p:nvPicPr>
+          <p:blipFill>
+            <a:blip r:embed="rId16" cstate="print"/>
+            <a:srcRect/>
+            <a:stretch>
+              <a:fillRect/>
+            </a:stretch>
+          </p:blipFill>
+          <p:spPr bwMode="auto">
+            <a:xfrm>
+              <a:off x="7229475" y="3498850"/>
+              <a:ext cx="22225" cy="488950"/>
+            </a:xfrm>
+            <a:prstGeom prst="rect">
+              <a:avLst/>
+            </a:prstGeom>
+            <a:noFill/>
+            <a:ln w="9525">
+              <a:noFill/>
+              <a:miter lim="800000"/>
+              <a:headEnd/>
+              <a:tailEnd/>
+            </a:ln>
+          </p:spPr>
+        </p:pic>
+        <p:pic>
+          <p:nvPicPr>
+            <p:cNvPr id="35" name="Picture 58"/>
+            <p:cNvPicPr>
+              <a:picLocks noChangeAspect="1" noChangeArrowheads="1"/>
+            </p:cNvPicPr>
+            <p:nvPr/>
+          </p:nvPicPr>
+          <p:blipFill>
+            <a:blip r:embed="rId17" cstate="print"/>
+            <a:srcRect/>
+            <a:stretch>
+              <a:fillRect/>
+            </a:stretch>
+          </p:blipFill>
+          <p:spPr bwMode="auto">
+            <a:xfrm>
+              <a:off x="7356475" y="3435350"/>
+              <a:ext cx="550863" cy="647700"/>
+            </a:xfrm>
+            <a:prstGeom prst="rect">
+              <a:avLst/>
+            </a:prstGeom>
+            <a:noFill/>
+            <a:ln w="9525">
+              <a:noFill/>
+              <a:miter lim="800000"/>
+              <a:headEnd/>
+              <a:tailEnd/>
+            </a:ln>
+          </p:spPr>
+        </p:pic>
+        <p:sp>
+          <p:nvSpPr>
+            <p:cNvPr id="39" name="Text Box 66"/>
+            <p:cNvSpPr txBox="1">
+              <a:spLocks noChangeArrowheads="1"/>
+            </p:cNvSpPr>
+            <p:nvPr/>
+          </p:nvSpPr>
+          <p:spPr bwMode="auto">
+            <a:xfrm>
+              <a:off x="6815137" y="3668741"/>
+              <a:ext cx="209550" cy="219017"/>
+            </a:xfrm>
+            <a:prstGeom prst="rect">
+              <a:avLst/>
+            </a:prstGeom>
+            <a:noFill/>
+            <a:ln>
+              <a:noFill/>
+            </a:ln>
+            <a:effectLst/>
+            <a:extLst>
+              <a:ext uri="{909E8E84-426E-40dd-AFC4-6F175D3DCCD1}">
+                <a14:hiddenFill xmlns:a14="http://schemas.microsoft.com/office/drawing/2010/main" xmlns="">
+                  <a:solidFill>
+                    <a:schemeClr val="accent1"/>
+                  </a:solidFill>
+                </a14:hiddenFill>
+              </a:ext>
+              <a:ext uri="{91240B29-F687-4f45-9708-019B960494DF}">
+                <a14:hiddenLine xmlns:a14="http://schemas.microsoft.com/office/drawing/2010/main" xmlns="" w="9525">
+                  <a:solidFill>
+                    <a:schemeClr val="tx1"/>
+                  </a:solidFill>
+                  <a:miter lim="800000"/>
+                  <a:headEnd/>
+                  <a:tailEnd/>
+                </a14:hiddenLine>
+              </a:ext>
+              <a:ext uri="{AF507438-7753-43e0-B8FC-AC1667EBCBE1}">
+                <a14:hiddenEffects xmlns:a14="http://schemas.microsoft.com/office/drawing/2010/main" xmlns="">
+                  <a:effectLst>
+                    <a:outerShdw blurRad="63500" dist="38099" dir="2700000" algn="ctr" rotWithShape="0">
+                      <a:schemeClr val="bg2">
+                        <a:alpha val="74998"/>
+                      </a:schemeClr>
+                    </a:outerShdw>
+                  </a:effectLst>
+                </a14:hiddenEffects>
+              </a:ext>
+            </a:extLst>
+          </p:spPr>
+          <p:txBody>
+            <a:bodyPr lIns="0" tIns="0" rIns="0" bIns="0" anchor="ctr">
+              <a:spAutoFit/>
+            </a:bodyPr>
+            <a:lstStyle>
+              <a:lvl1pPr>
+                <a:defRPr sz="2400">
+                  <a:solidFill>
+                    <a:schemeClr val="tx1"/>
+                  </a:solidFill>
+                  <a:latin typeface="Times New Roman" charset="0"/>
+                  <a:ea typeface="ＭＳ Ｐゴシック" charset="0"/>
+                </a:defRPr>
+              </a:lvl1pPr>
+              <a:lvl2pPr indent="-342900">
+                <a:defRPr sz="2400">
+                  <a:solidFill>
+                    <a:schemeClr val="tx1"/>
+                  </a:solidFill>
+                  <a:latin typeface="Times New Roman" charset="0"/>
+                  <a:ea typeface="ＭＳ Ｐゴシック" charset="0"/>
+                </a:defRPr>
+              </a:lvl2pPr>
+              <a:lvl3pPr marL="857250" indent="-285750">
+                <a:defRPr sz="2400">
+                  <a:solidFill>
+                    <a:schemeClr val="tx1"/>
+                  </a:solidFill>
+                  <a:latin typeface="Times New Roman" charset="0"/>
+                  <a:ea typeface="ＭＳ Ｐゴシック" charset="0"/>
+                </a:defRPr>
+              </a:lvl3pPr>
+              <a:lvl4pPr marL="1257300" indent="-228600">
+                <a:defRPr sz="2400">
+                  <a:solidFill>
+                    <a:schemeClr val="tx1"/>
+                  </a:solidFill>
+                  <a:latin typeface="Times New Roman" charset="0"/>
+                  <a:ea typeface="ＭＳ Ｐゴシック" charset="0"/>
+                </a:defRPr>
+              </a:lvl4pPr>
+              <a:lvl5pPr marL="1714500" indent="-228600">
+                <a:defRPr sz="2400">
+                  <a:solidFill>
+                    <a:schemeClr val="tx1"/>
+                  </a:solidFill>
+                  <a:latin typeface="Times New Roman" charset="0"/>
+                  <a:ea typeface="ＭＳ Ｐゴシック" charset="0"/>
+                </a:defRPr>
+              </a:lvl5pPr>
+              <a:lvl6pPr marL="2171700" indent="-228600" fontAlgn="base">
+                <a:spcBef>
+                  <a:spcPct val="0"/>
+                </a:spcBef>
+                <a:spcAft>
+                  <a:spcPct val="0"/>
+                </a:spcAft>
+                <a:defRPr sz="2400">
+                  <a:solidFill>
+                    <a:schemeClr val="tx1"/>
+                  </a:solidFill>
+                  <a:latin typeface="Times New Roman" charset="0"/>
+                  <a:ea typeface="ＭＳ Ｐゴシック" charset="0"/>
+                </a:defRPr>
+              </a:lvl6pPr>
+              <a:lvl7pPr marL="2628900" indent="-228600" fontAlgn="base">
+                <a:spcBef>
+                  <a:spcPct val="0"/>
+                </a:spcBef>
+                <a:spcAft>
+                  <a:spcPct val="0"/>
+                </a:spcAft>
+                <a:defRPr sz="2400">
+                  <a:solidFill>
+                    <a:schemeClr val="tx1"/>
+                  </a:solidFill>
+                  <a:latin typeface="Times New Roman" charset="0"/>
+                  <a:ea typeface="ＭＳ Ｐゴシック" charset="0"/>
+                </a:defRPr>
+              </a:lvl7pPr>
+              <a:lvl8pPr marL="3086100" indent="-228600" fontAlgn="base">
+                <a:spcBef>
+                  <a:spcPct val="0"/>
+                </a:spcBef>
+                <a:spcAft>
+                  <a:spcPct val="0"/>
+                </a:spcAft>
+                <a:defRPr sz="2400">
+                  <a:solidFill>
+                    <a:schemeClr val="tx1"/>
+                  </a:solidFill>
+                  <a:latin typeface="Times New Roman" charset="0"/>
+                  <a:ea typeface="ＭＳ Ｐゴシック" charset="0"/>
+                </a:defRPr>
+              </a:lvl8pPr>
+              <a:lvl9pPr marL="3543300" indent="-228600" fontAlgn="base">
+                <a:spcBef>
+                  <a:spcPct val="0"/>
+                </a:spcBef>
+                <a:spcAft>
+                  <a:spcPct val="0"/>
+                </a:spcAft>
+                <a:defRPr sz="2400">
+                  <a:solidFill>
+                    <a:schemeClr val="tx1"/>
+                  </a:solidFill>
+                  <a:latin typeface="Times New Roman" charset="0"/>
+                  <a:ea typeface="ＭＳ Ｐゴシック" charset="0"/>
+                </a:defRPr>
+              </a:lvl9pPr>
+            </a:lstStyle>
+            <a:p>
+              <a:pPr algn="ctr">
+                <a:lnSpc>
+                  <a:spcPct val="95000"/>
+                </a:lnSpc>
+                <a:defRPr/>
+              </a:pPr>
+              <a:endParaRPr lang="en-US" sz="1050" dirty="0" smtClean="0">
+                <a:solidFill>
+                  <a:srgbClr val="000000"/>
+                </a:solidFill>
+                <a:latin typeface="Arial" charset="0"/>
+              </a:endParaRPr>
+            </a:p>
+          </p:txBody>
+        </p:sp>
+      </p:grpSp>
     </p:spTree>
   </p:cSld>
   <p:clrMapOvr>
@@ -6983,7 +9824,7 @@
           <a:p>
             <a:r>
               <a:rPr lang="en-US" dirty="0" smtClean="0"/>
-              <a:t>Gerrit Workflow</a:t>
+              <a:t>Gerrit</a:t>
             </a:r>
             <a:endParaRPr lang="en-US" dirty="0"/>
           </a:p>
@@ -7010,27 +9851,37 @@
             </a:pPr>
             <a:r>
               <a:rPr lang="en-US" dirty="0" smtClean="0"/>
-              <a:t>Master branch contains only reviewed and approved changes</a:t>
-            </a:r>
-          </a:p>
-          <a:p>
-            <a:pPr marL="342900" indent="-342900">
+              <a:t>Web-based code review system based on JGit</a:t>
+            </a:r>
+          </a:p>
+          <a:p>
+            <a:pPr marL="342900" lvl="0" indent="-342900">
               <a:buFont typeface="Arial" pitchFamily="34" charset="0"/>
               <a:buChar char="•"/>
             </a:pPr>
             <a:r>
               <a:rPr lang="en-US" dirty="0" smtClean="0"/>
-              <a:t>Each change is based on the master branch to have a stable starting point</a:t>
-            </a:r>
-          </a:p>
-          <a:p>
-            <a:pPr marL="342900" indent="-342900">
+              <a:t>Open Source (Apache 2 license)</a:t>
+            </a:r>
+          </a:p>
+          <a:p>
+            <a:pPr marL="342900" lvl="0" indent="-342900">
               <a:buFont typeface="Arial" pitchFamily="34" charset="0"/>
               <a:buChar char="•"/>
             </a:pPr>
             <a:r>
               <a:rPr lang="en-US" dirty="0" smtClean="0"/>
-              <a:t>Typical workflow</a:t>
+              <a:t>Also serves as Git server adding access control and workflow</a:t>
+            </a:r>
+          </a:p>
+          <a:p>
+            <a:pPr marL="342900" lvl="0" indent="-342900">
+              <a:buFont typeface="Arial" pitchFamily="34" charset="0"/>
+              <a:buChar char="•"/>
+            </a:pPr>
+            <a:r>
+              <a:rPr lang="en-US" dirty="0" smtClean="0"/>
+              <a:t>Used by</a:t>
             </a:r>
           </a:p>
           <a:p>
@@ -7040,7 +9891,7 @@
             </a:pPr>
             <a:r>
               <a:rPr lang="en-US" dirty="0" smtClean="0"/>
-              <a:t>Make a change and commit it to your local Git repository</a:t>
+              <a:t>Android</a:t>
             </a:r>
           </a:p>
           <a:p>
@@ -7050,15 +9901,15 @@
             </a:pPr>
             <a:r>
               <a:rPr lang="en-US" dirty="0" smtClean="0"/>
-              <a:t>Push commit </a:t>
-            </a:r>
-            <a:r>
-              <a:rPr lang="en-US" dirty="0" smtClean="0"/>
-              <a:t>to </a:t>
-            </a:r>
-            <a:r>
-              <a:rPr lang="en-US" dirty="0" smtClean="0"/>
-              <a:t>Gerrit</a:t>
+              <a:t>JGit, </a:t>
+            </a:r>
+            <a:r>
+              <a:rPr lang="en-US" dirty="0" err="1" smtClean="0"/>
+              <a:t>EGit</a:t>
+            </a:r>
+            <a:r>
+              <a:rPr lang="en-US" dirty="0" smtClean="0"/>
+              <a:t> (other Eclipse projects want it…)</a:t>
             </a:r>
           </a:p>
           <a:p>
@@ -7068,7 +9919,7 @@
             </a:pPr>
             <a:r>
               <a:rPr lang="en-US" dirty="0" smtClean="0"/>
-              <a:t>Invite reviewers</a:t>
+              <a:t>Google</a:t>
             </a:r>
           </a:p>
           <a:p>
@@ -7078,41 +9929,43 @@
             </a:pPr>
             <a:r>
               <a:rPr lang="en-US" dirty="0" smtClean="0"/>
-              <a:t>Comments and discussions in the context of the change</a:t>
-            </a:r>
-          </a:p>
-          <a:p>
-            <a:pPr marL="612775" lvl="2" indent="-342900">
-              <a:buFont typeface="Arial" pitchFamily="34" charset="0"/>
-              <a:buChar char="•"/>
-            </a:pPr>
-            <a:r>
-              <a:rPr lang="en-US" dirty="0" smtClean="0"/>
-              <a:t>Fetch it, test it, improve it, …</a:t>
-            </a:r>
-          </a:p>
-          <a:p>
-            <a:pPr marL="612775" lvl="2" indent="-342900">
-              <a:buFont typeface="Arial" pitchFamily="34" charset="0"/>
-              <a:buChar char="•"/>
-            </a:pPr>
-            <a:r>
-              <a:rPr lang="en-US" dirty="0" smtClean="0"/>
-              <a:t>Create a new patch set and push to Gerrit (amend commit, old one is replaced)</a:t>
-            </a:r>
-          </a:p>
-          <a:p>
-            <a:pPr marL="612775" lvl="2" indent="-342900">
-              <a:buFont typeface="Arial" pitchFamily="34" charset="0"/>
-              <a:buChar char="•"/>
-            </a:pPr>
-            <a:r>
-              <a:rPr lang="en-US" dirty="0" smtClean="0"/>
-              <a:t>Submit to master branch (or abandon it…)</a:t>
+              <a:t>SAP</a:t>
             </a:r>
           </a:p>
         </p:txBody>
       </p:sp>
+      <p:pic>
+        <p:nvPicPr>
+          <p:cNvPr id="5" name="Picture 25"/>
+          <p:cNvPicPr>
+            <a:picLocks noChangeAspect="1" noChangeArrowheads="1"/>
+          </p:cNvPicPr>
+          <p:nvPr/>
+        </p:nvPicPr>
+        <p:blipFill>
+          <a:blip r:embed="rId3" cstate="print"/>
+          <a:srcRect/>
+          <a:stretch>
+            <a:fillRect/>
+          </a:stretch>
+        </p:blipFill>
+        <p:spPr bwMode="auto">
+          <a:xfrm>
+            <a:off x="8302345" y="382120"/>
+            <a:ext cx="515937" cy="504825"/>
+          </a:xfrm>
+          <a:prstGeom prst="rect">
+            <a:avLst/>
+          </a:prstGeom>
+          <a:noFill/>
+          <a:ln w="9525">
+            <a:noFill/>
+            <a:miter lim="800000"/>
+            <a:headEnd/>
+            <a:tailEnd/>
+          </a:ln>
+        </p:spPr>
+      </p:pic>
     </p:spTree>
   </p:cSld>
   <p:clrMapOvr>
@@ -7148,6 +10001,210 @@
       </p:grpSpPr>
       <p:sp>
         <p:nvSpPr>
+          <p:cNvPr id="2" name="Title 1"/>
+          <p:cNvSpPr>
+            <a:spLocks noGrp="1"/>
+          </p:cNvSpPr>
+          <p:nvPr>
+            <p:ph type="title"/>
+          </p:nvPr>
+        </p:nvSpPr>
+        <p:spPr/>
+        <p:txBody>
+          <a:bodyPr/>
+          <a:lstStyle/>
+          <a:p>
+            <a:r>
+              <a:rPr lang="en-US" dirty="0" smtClean="0"/>
+              <a:t>Gerrit Workflow</a:t>
+            </a:r>
+            <a:endParaRPr lang="en-US" dirty="0"/>
+          </a:p>
+        </p:txBody>
+      </p:sp>
+      <p:sp>
+        <p:nvSpPr>
+          <p:cNvPr id="3" name="Text Placeholder 2"/>
+          <p:cNvSpPr>
+            <a:spLocks noGrp="1"/>
+          </p:cNvSpPr>
+          <p:nvPr>
+            <p:ph type="body" sz="quarter" idx="10"/>
+          </p:nvPr>
+        </p:nvSpPr>
+        <p:spPr/>
+        <p:txBody>
+          <a:bodyPr/>
+          <a:lstStyle/>
+          <a:p>
+            <a:pPr marL="342900" indent="-342900">
+              <a:buFont typeface="Arial" pitchFamily="34" charset="0"/>
+              <a:buChar char="•"/>
+            </a:pPr>
+            <a:r>
+              <a:rPr lang="en-US" dirty="0" smtClean="0"/>
+              <a:t>Master branch contains only reviewed and approved changes</a:t>
+            </a:r>
+          </a:p>
+          <a:p>
+            <a:pPr marL="342900" indent="-342900">
+              <a:buFont typeface="Arial" pitchFamily="34" charset="0"/>
+              <a:buChar char="•"/>
+            </a:pPr>
+            <a:r>
+              <a:rPr lang="en-US" dirty="0" smtClean="0"/>
+              <a:t>Each change is based on the master branch to have a stable starting point</a:t>
+            </a:r>
+          </a:p>
+          <a:p>
+            <a:pPr marL="342900" indent="-342900">
+              <a:buFont typeface="Arial" pitchFamily="34" charset="0"/>
+              <a:buChar char="•"/>
+            </a:pPr>
+            <a:r>
+              <a:rPr lang="en-US" dirty="0" smtClean="0"/>
+              <a:t>Typical workflow</a:t>
+            </a:r>
+          </a:p>
+          <a:p>
+            <a:pPr marL="612775" lvl="2" indent="-342900">
+              <a:buFont typeface="Arial" pitchFamily="34" charset="0"/>
+              <a:buChar char="•"/>
+            </a:pPr>
+            <a:r>
+              <a:rPr lang="en-US" dirty="0" smtClean="0"/>
+              <a:t>Make a change and commit it to your local Git repository</a:t>
+            </a:r>
+          </a:p>
+          <a:p>
+            <a:pPr marL="612775" lvl="2" indent="-342900">
+              <a:buFont typeface="Arial" pitchFamily="34" charset="0"/>
+              <a:buChar char="•"/>
+            </a:pPr>
+            <a:r>
+              <a:rPr lang="en-US" dirty="0" smtClean="0"/>
+              <a:t>Push commit to Gerrit</a:t>
+            </a:r>
+          </a:p>
+          <a:p>
+            <a:pPr marL="612775" lvl="2" indent="-342900">
+              <a:buFont typeface="Arial" pitchFamily="34" charset="0"/>
+              <a:buChar char="•"/>
+            </a:pPr>
+            <a:r>
+              <a:rPr lang="en-US" dirty="0" smtClean="0"/>
+              <a:t>Invite reviewers</a:t>
+            </a:r>
+          </a:p>
+          <a:p>
+            <a:pPr marL="612775" lvl="2" indent="-342900">
+              <a:buFont typeface="Arial" pitchFamily="34" charset="0"/>
+              <a:buChar char="•"/>
+            </a:pPr>
+            <a:r>
+              <a:rPr lang="en-US" dirty="0" smtClean="0"/>
+              <a:t>Comments and discussions in the context of the change</a:t>
+            </a:r>
+          </a:p>
+          <a:p>
+            <a:pPr marL="612775" lvl="2" indent="-342900">
+              <a:buFont typeface="Arial" pitchFamily="34" charset="0"/>
+              <a:buChar char="•"/>
+            </a:pPr>
+            <a:r>
+              <a:rPr lang="en-US" dirty="0" smtClean="0"/>
+              <a:t>Fetch it, test it, improve it, …</a:t>
+            </a:r>
+          </a:p>
+          <a:p>
+            <a:pPr marL="612775" lvl="2" indent="-342900">
+              <a:buFont typeface="Arial" pitchFamily="34" charset="0"/>
+              <a:buChar char="•"/>
+            </a:pPr>
+            <a:r>
+              <a:rPr lang="en-US" dirty="0" smtClean="0"/>
+              <a:t>Create a new patch set and push to Gerrit (amend commit, old one is replaced)</a:t>
+            </a:r>
+          </a:p>
+          <a:p>
+            <a:pPr marL="612775" lvl="2" indent="-342900">
+              <a:buFont typeface="Arial" pitchFamily="34" charset="0"/>
+              <a:buChar char="•"/>
+            </a:pPr>
+            <a:r>
+              <a:rPr lang="en-US" dirty="0" smtClean="0"/>
+              <a:t>Submit to master branch (or abandon it…)</a:t>
+            </a:r>
+          </a:p>
+        </p:txBody>
+      </p:sp>
+      <p:pic>
+        <p:nvPicPr>
+          <p:cNvPr id="4" name="Picture 25"/>
+          <p:cNvPicPr>
+            <a:picLocks noChangeAspect="1" noChangeArrowheads="1"/>
+          </p:cNvPicPr>
+          <p:nvPr/>
+        </p:nvPicPr>
+        <p:blipFill>
+          <a:blip r:embed="rId3" cstate="print"/>
+          <a:srcRect/>
+          <a:stretch>
+            <a:fillRect/>
+          </a:stretch>
+        </p:blipFill>
+        <p:spPr bwMode="auto">
+          <a:xfrm>
+            <a:off x="8302345" y="382120"/>
+            <a:ext cx="515937" cy="504825"/>
+          </a:xfrm>
+          <a:prstGeom prst="rect">
+            <a:avLst/>
+          </a:prstGeom>
+          <a:noFill/>
+          <a:ln w="9525">
+            <a:noFill/>
+            <a:miter lim="800000"/>
+            <a:headEnd/>
+            <a:tailEnd/>
+          </a:ln>
+        </p:spPr>
+      </p:pic>
+    </p:spTree>
+  </p:cSld>
+  <p:clrMapOvr>
+    <a:masterClrMapping/>
+  </p:clrMapOvr>
+  <p:transition spd="med"/>
+  <p:timing>
+    <p:tnLst>
+      <p:par>
+        <p:cTn id="1" dur="indefinite" restart="never" nodeType="tmRoot"/>
+      </p:par>
+    </p:tnLst>
+  </p:timing>
+</p:sld>
+</file>
+
+<file path=ppt/slides/slide5.xml><?xml version="1.0" encoding="utf-8"?>
+<p:sld xmlns:a="http://schemas.openxmlformats.org/drawingml/2006/main" xmlns:r="http://schemas.openxmlformats.org/officeDocument/2006/relationships" xmlns:p="http://schemas.openxmlformats.org/presentationml/2006/main">
+  <p:cSld>
+    <p:spTree>
+      <p:nvGrpSpPr>
+        <p:cNvPr id="1" name=""/>
+        <p:cNvGrpSpPr/>
+        <p:nvPr/>
+      </p:nvGrpSpPr>
+      <p:grpSpPr>
+        <a:xfrm>
+          <a:off x="0" y="0"/>
+          <a:ext cx="0" cy="0"/>
+          <a:chOff x="0" y="0"/>
+          <a:chExt cx="0" cy="0"/>
+        </a:xfrm>
+      </p:grpSpPr>
+      <p:sp>
+        <p:nvSpPr>
           <p:cNvPr id="5" name="Title 4"/>
           <p:cNvSpPr>
             <a:spLocks noGrp="1"/>
@@ -7184,7 +10241,314 @@
 </p:sld>
 </file>
 
-<file path=ppt/slides/slide5.xml><?xml version="1.0" encoding="utf-8"?>
+<file path=ppt/slides/slide6.xml><?xml version="1.0" encoding="utf-8"?>
+<p:sld xmlns:a="http://schemas.openxmlformats.org/drawingml/2006/main" xmlns:r="http://schemas.openxmlformats.org/officeDocument/2006/relationships" xmlns:p="http://schemas.openxmlformats.org/presentationml/2006/main">
+  <p:cSld>
+    <p:spTree>
+      <p:nvGrpSpPr>
+        <p:cNvPr id="1" name=""/>
+        <p:cNvGrpSpPr/>
+        <p:nvPr/>
+      </p:nvGrpSpPr>
+      <p:grpSpPr>
+        <a:xfrm>
+          <a:off x="0" y="0"/>
+          <a:ext cx="0" cy="0"/>
+          <a:chOff x="0" y="0"/>
+          <a:chExt cx="0" cy="0"/>
+        </a:xfrm>
+      </p:grpSpPr>
+      <p:sp>
+        <p:nvSpPr>
+          <p:cNvPr id="2" name="Title 1"/>
+          <p:cNvSpPr>
+            <a:spLocks noGrp="1"/>
+          </p:cNvSpPr>
+          <p:nvPr>
+            <p:ph type="title"/>
+          </p:nvPr>
+        </p:nvSpPr>
+        <p:spPr/>
+        <p:txBody>
+          <a:bodyPr/>
+          <a:lstStyle/>
+          <a:p>
+            <a:r>
+              <a:rPr lang="en-US" dirty="0" smtClean="0"/>
+              <a:t>Contribute!</a:t>
+            </a:r>
+            <a:endParaRPr lang="en-US" dirty="0"/>
+          </a:p>
+        </p:txBody>
+      </p:sp>
+      <p:sp>
+        <p:nvSpPr>
+          <p:cNvPr id="3" name="Text Placeholder 2"/>
+          <p:cNvSpPr>
+            <a:spLocks noGrp="1"/>
+          </p:cNvSpPr>
+          <p:nvPr>
+            <p:ph type="body" sz="quarter" idx="10"/>
+          </p:nvPr>
+        </p:nvSpPr>
+        <p:spPr/>
+        <p:txBody>
+          <a:bodyPr/>
+          <a:lstStyle/>
+          <a:p>
+            <a:pPr marL="342900" indent="-342900">
+              <a:buFont typeface="Arial" pitchFamily="34" charset="0"/>
+              <a:buChar char="•"/>
+            </a:pPr>
+            <a:r>
+              <a:rPr lang="en-US" dirty="0" smtClean="0"/>
+              <a:t>Mylyn Reviews</a:t>
+            </a:r>
+            <a:endParaRPr lang="en-US" dirty="0" smtClean="0">
+              <a:hlinkClick r:id="rId3"/>
+            </a:endParaRPr>
+          </a:p>
+          <a:p>
+            <a:pPr marL="612775" lvl="2" indent="-342900">
+              <a:buFont typeface="Arial" pitchFamily="34" charset="0"/>
+              <a:buChar char="•"/>
+            </a:pPr>
+            <a:r>
+              <a:rPr lang="en-US" dirty="0" smtClean="0">
+                <a:hlinkClick r:id="rId3"/>
+              </a:rPr>
+              <a:t>http</a:t>
+            </a:r>
+            <a:r>
+              <a:rPr lang="en-US" dirty="0" smtClean="0">
+                <a:hlinkClick r:id="rId3"/>
+              </a:rPr>
+              <a:t>://</a:t>
+            </a:r>
+            <a:r>
+              <a:rPr lang="en-US" dirty="0" smtClean="0">
+                <a:hlinkClick r:id="rId3"/>
+              </a:rPr>
+              <a:t>www.eclipse.org/reviews</a:t>
+            </a:r>
+            <a:endParaRPr lang="en-US" dirty="0" smtClean="0"/>
+          </a:p>
+          <a:p>
+            <a:pPr marL="342900" indent="-342900">
+              <a:buFont typeface="Arial" pitchFamily="34" charset="0"/>
+              <a:buChar char="•"/>
+            </a:pPr>
+            <a:r>
+              <a:rPr lang="en-US" dirty="0" smtClean="0"/>
+              <a:t>Mylyn Builds</a:t>
+            </a:r>
+            <a:endParaRPr lang="en-US" dirty="0" smtClean="0">
+              <a:hlinkClick r:id="rId4"/>
+            </a:endParaRPr>
+          </a:p>
+          <a:p>
+            <a:pPr marL="612775" lvl="2" indent="-342900">
+              <a:buFont typeface="Arial" pitchFamily="34" charset="0"/>
+              <a:buChar char="•"/>
+            </a:pPr>
+            <a:r>
+              <a:rPr lang="en-US" dirty="0" smtClean="0">
+                <a:hlinkClick r:id="rId4"/>
+              </a:rPr>
+              <a:t>http</a:t>
+            </a:r>
+            <a:r>
+              <a:rPr lang="en-US" dirty="0" smtClean="0">
+                <a:hlinkClick r:id="rId4"/>
+              </a:rPr>
+              <a:t>://</a:t>
+            </a:r>
+            <a:r>
+              <a:rPr lang="en-US" dirty="0" smtClean="0">
+                <a:hlinkClick r:id="rId4"/>
+              </a:rPr>
+              <a:t>www.eclipse.org/mylyn/builds</a:t>
+            </a:r>
+            <a:endParaRPr lang="en-US" dirty="0" smtClean="0"/>
+          </a:p>
+          <a:p>
+            <a:pPr marL="342900" indent="-342900">
+              <a:buFont typeface="Arial" pitchFamily="34" charset="0"/>
+              <a:buChar char="•"/>
+            </a:pPr>
+            <a:r>
+              <a:rPr lang="en-US" dirty="0" smtClean="0"/>
+              <a:t>Egit/</a:t>
+            </a:r>
+            <a:r>
+              <a:rPr lang="en-US" dirty="0" err="1" smtClean="0"/>
+              <a:t>Jgit</a:t>
+            </a:r>
+            <a:endParaRPr lang="en-US" dirty="0" smtClean="0">
+              <a:hlinkClick r:id="rId5"/>
+            </a:endParaRPr>
+          </a:p>
+          <a:p>
+            <a:pPr marL="612775" lvl="2" indent="-342900">
+              <a:buFont typeface="Arial" pitchFamily="34" charset="0"/>
+              <a:buChar char="•"/>
+            </a:pPr>
+            <a:r>
+              <a:rPr lang="en-US" dirty="0" smtClean="0">
+                <a:hlinkClick r:id="rId5"/>
+              </a:rPr>
+              <a:t>http</a:t>
+            </a:r>
+            <a:r>
+              <a:rPr lang="en-US" dirty="0" smtClean="0">
+                <a:hlinkClick r:id="rId5"/>
+              </a:rPr>
+              <a:t>://</a:t>
+            </a:r>
+            <a:r>
+              <a:rPr lang="en-US" dirty="0" smtClean="0">
+                <a:hlinkClick r:id="rId5"/>
+              </a:rPr>
+              <a:t>www.eclipse.org/egit</a:t>
+            </a:r>
+            <a:endParaRPr lang="en-US" dirty="0" smtClean="0"/>
+          </a:p>
+          <a:p>
+            <a:pPr marL="342900" indent="-342900">
+              <a:buFont typeface="Arial" pitchFamily="34" charset="0"/>
+              <a:buChar char="•"/>
+            </a:pPr>
+            <a:r>
+              <a:rPr lang="en-US" dirty="0" smtClean="0"/>
+              <a:t>Gerrit Code Review</a:t>
+            </a:r>
+            <a:endParaRPr lang="en-US" dirty="0" smtClean="0">
+              <a:hlinkClick r:id="rId6"/>
+            </a:endParaRPr>
+          </a:p>
+          <a:p>
+            <a:pPr marL="612775" lvl="2" indent="-342900">
+              <a:buFont typeface="Arial" pitchFamily="34" charset="0"/>
+              <a:buChar char="•"/>
+            </a:pPr>
+            <a:r>
+              <a:rPr lang="en-US" dirty="0" smtClean="0">
+                <a:hlinkClick r:id="rId6"/>
+              </a:rPr>
+              <a:t>https</a:t>
+            </a:r>
+            <a:r>
+              <a:rPr lang="en-US" dirty="0" smtClean="0">
+                <a:hlinkClick r:id="rId6"/>
+              </a:rPr>
+              <a:t>://</a:t>
+            </a:r>
+            <a:r>
+              <a:rPr lang="en-US" dirty="0" smtClean="0">
+                <a:hlinkClick r:id="rId6"/>
+              </a:rPr>
+              <a:t>review.source.android.com</a:t>
+            </a:r>
+            <a:endParaRPr lang="en-US" dirty="0" smtClean="0"/>
+          </a:p>
+          <a:p>
+            <a:pPr marL="342900" indent="-342900">
+              <a:buFont typeface="Arial" pitchFamily="34" charset="0"/>
+              <a:buChar char="•"/>
+            </a:pPr>
+            <a:r>
+              <a:rPr lang="en-US" dirty="0" smtClean="0"/>
+              <a:t>Jenkins Gerrit Trigger</a:t>
+            </a:r>
+            <a:endParaRPr lang="en-US" dirty="0" smtClean="0"/>
+          </a:p>
+          <a:p>
+            <a:pPr marL="612775" lvl="2" indent="-342900">
+              <a:buFont typeface="Arial" pitchFamily="34" charset="0"/>
+              <a:buChar char="•"/>
+            </a:pPr>
+            <a:r>
+              <a:rPr lang="en-US" dirty="0" smtClean="0">
+                <a:hlinkClick r:id="rId7"/>
+              </a:rPr>
+              <a:t>https</a:t>
+            </a:r>
+            <a:r>
+              <a:rPr lang="en-US" dirty="0" smtClean="0">
+                <a:hlinkClick r:id="rId7"/>
+              </a:rPr>
+              <a:t>://</a:t>
+            </a:r>
+            <a:r>
+              <a:rPr lang="en-US" dirty="0" smtClean="0">
+                <a:hlinkClick r:id="rId7"/>
+              </a:rPr>
+              <a:t>wiki.jenkins-ci.org/display/JENKINS/Gerrit+Trigger</a:t>
+            </a:r>
+            <a:endParaRPr lang="en-US" dirty="0" smtClean="0"/>
+          </a:p>
+          <a:p>
+            <a:pPr marL="342900" indent="-342900">
+              <a:buFont typeface="Arial" pitchFamily="34" charset="0"/>
+              <a:buChar char="•"/>
+            </a:pPr>
+            <a:endParaRPr lang="en-US" dirty="0" smtClean="0"/>
+          </a:p>
+          <a:p>
+            <a:pPr marL="342900" indent="-342900"/>
+            <a:endParaRPr lang="en-US" dirty="0" smtClean="0"/>
+          </a:p>
+        </p:txBody>
+      </p:sp>
+      <p:pic>
+        <p:nvPicPr>
+          <p:cNvPr id="4" name="Picture 7"/>
+          <p:cNvPicPr>
+            <a:picLocks noChangeAspect="1" noChangeArrowheads="1"/>
+          </p:cNvPicPr>
+          <p:nvPr/>
+        </p:nvPicPr>
+        <p:blipFill>
+          <a:blip r:embed="rId8" cstate="print"/>
+          <a:srcRect/>
+          <a:stretch>
+            <a:fillRect/>
+          </a:stretch>
+        </p:blipFill>
+        <p:spPr bwMode="auto">
+          <a:xfrm>
+            <a:off x="8101013" y="419100"/>
+            <a:ext cx="896937" cy="514350"/>
+          </a:xfrm>
+          <a:prstGeom prst="rect">
+            <a:avLst/>
+          </a:prstGeom>
+          <a:noFill/>
+          <a:ln w="9525">
+            <a:noFill/>
+            <a:miter lim="800000"/>
+            <a:headEnd/>
+            <a:tailEnd/>
+          </a:ln>
+        </p:spPr>
+      </p:pic>
+    </p:spTree>
+  </p:cSld>
+  <p:clrMapOvr>
+    <a:masterClrMapping/>
+  </p:clrMapOvr>
+  <p:transition spd="med"/>
+  <p:timing>
+    <p:tnLst>
+      <p:par>
+        <p:cTn id="1" dur="indefinite" restart="never" nodeType="tmRoot"/>
+      </p:par>
+    </p:tnLst>
+  </p:timing>
+</p:sld>
+</file>
+
+<file path=ppt/slides/slide7.xml><?xml version="1.0" encoding="utf-8"?>
 <p:sld xmlns:a="http://schemas.openxmlformats.org/drawingml/2006/main" xmlns:r="http://schemas.openxmlformats.org/officeDocument/2006/relationships" xmlns:p="http://schemas.openxmlformats.org/presentationml/2006/main" show="0">
   <p:cSld>
     <p:spTree>
@@ -7217,7 +10581,7 @@
 </p:sld>
 </file>
 
-<file path=ppt/slides/slide6.xml><?xml version="1.0" encoding="utf-8"?>
+<file path=ppt/slides/slide8.xml><?xml version="1.0" encoding="utf-8"?>
 <p:sld xmlns:a="http://schemas.openxmlformats.org/drawingml/2006/main" xmlns:r="http://schemas.openxmlformats.org/officeDocument/2006/relationships" xmlns:p="http://schemas.openxmlformats.org/presentationml/2006/main" show="0">
   <p:cSld>
     <p:spTree>

</xml_diff>

<commit_message>
Updated for Darmstadt Democamp
Change-Id: I6ba64d90ac869ad559e461d06c7e88b7ea82f74e
</commit_message>
<xml_diff>
--- a/democamp-indigo/Integrating Git, Gerrit and Jenkins with Mylyn.pptx
+++ b/democamp-indigo/Integrating Git, Gerrit and Jenkins with Mylyn.pptx
@@ -1066,7 +1066,6 @@
               <a:rPr lang="en-US" b="0" baseline="0" dirty="0" smtClean="0"/>
               <a:t>We are in a constant state of flow coding at the speed of thought</a:t>
             </a:r>
-            <a:endParaRPr lang="en-US" b="0" baseline="0" dirty="0" smtClean="0"/>
           </a:p>
         </p:txBody>
       </p:sp>
@@ -2206,7 +2205,7 @@
           <a:blip r:embed="rId2" cstate="print">
             <a:extLst>
               <a:ext uri="{28A0092B-C50C-407E-A947-70E740481C1C}">
-                <a14:useLocalDpi xmlns:a14="http://schemas.microsoft.com/office/drawing/2010/main" xmlns="" val="0"/>
+                <a14:useLocalDpi xmlns="" xmlns:a14="http://schemas.microsoft.com/office/drawing/2010/main" val="0"/>
               </a:ext>
             </a:extLst>
           </a:blip>
@@ -4058,7 +4057,7 @@
           <a:blip r:embed="rId2" cstate="print">
             <a:extLst>
               <a:ext uri="{28A0092B-C50C-407E-A947-70E740481C1C}">
-                <a14:useLocalDpi xmlns:a14="http://schemas.microsoft.com/office/drawing/2010/main" xmlns="" val="0"/>
+                <a14:useLocalDpi xmlns="" xmlns:a14="http://schemas.microsoft.com/office/drawing/2010/main" val="0"/>
               </a:ext>
             </a:extLst>
           </a:blip>
@@ -5919,7 +5918,7 @@
           <a:blip r:embed="rId2" cstate="print">
             <a:extLst>
               <a:ext uri="{28A0092B-C50C-407E-A947-70E740481C1C}">
-                <a14:useLocalDpi xmlns:a14="http://schemas.microsoft.com/office/drawing/2010/main" xmlns="" val="0"/>
+                <a14:useLocalDpi xmlns="" xmlns:a14="http://schemas.microsoft.com/office/drawing/2010/main" val="0"/>
               </a:ext>
             </a:extLst>
           </a:blip>
@@ -6122,7 +6121,7 @@
           <a:blip r:embed="rId2" cstate="print">
             <a:extLst>
               <a:ext uri="{28A0092B-C50C-407E-A947-70E740481C1C}">
-                <a14:useLocalDpi xmlns:a14="http://schemas.microsoft.com/office/drawing/2010/main" xmlns="" val="0"/>
+                <a14:useLocalDpi xmlns="" xmlns:a14="http://schemas.microsoft.com/office/drawing/2010/main" val="0"/>
               </a:ext>
             </a:extLst>
           </a:blip>
@@ -6498,7 +6497,7 @@
           <a:blip r:embed="rId2" cstate="print">
             <a:extLst>
               <a:ext uri="{28A0092B-C50C-407E-A947-70E740481C1C}">
-                <a14:useLocalDpi xmlns:a14="http://schemas.microsoft.com/office/drawing/2010/main" xmlns="" val="0"/>
+                <a14:useLocalDpi xmlns="" xmlns:a14="http://schemas.microsoft.com/office/drawing/2010/main" val="0"/>
               </a:ext>
             </a:extLst>
           </a:blip>
@@ -6726,7 +6725,7 @@
           <a:blip r:embed="rId2" cstate="print">
             <a:extLst>
               <a:ext uri="{28A0092B-C50C-407E-A947-70E740481C1C}">
-                <a14:useLocalDpi xmlns:a14="http://schemas.microsoft.com/office/drawing/2010/main" xmlns="" val="0"/>
+                <a14:useLocalDpi xmlns="" xmlns:a14="http://schemas.microsoft.com/office/drawing/2010/main" val="0"/>
               </a:ext>
             </a:extLst>
           </a:blip>
@@ -6946,7 +6945,7 @@
           <a:blip r:embed="rId2" cstate="print">
             <a:extLst>
               <a:ext uri="{28A0092B-C50C-407E-A947-70E740481C1C}">
-                <a14:useLocalDpi xmlns:a14="http://schemas.microsoft.com/office/drawing/2010/main" xmlns="" val="0"/>
+                <a14:useLocalDpi xmlns="" xmlns:a14="http://schemas.microsoft.com/office/drawing/2010/main" val="0"/>
               </a:ext>
             </a:extLst>
           </a:blip>
@@ -8046,7 +8045,7 @@
           <a:blip r:embed="rId4" cstate="print">
             <a:extLst>
               <a:ext uri="{28A0092B-C50C-407E-A947-70E740481C1C}">
-                <a14:useLocalDpi xmlns:a14="http://schemas.microsoft.com/office/drawing/2010/main" xmlns="" val="0"/>
+                <a14:useLocalDpi xmlns="" xmlns:a14="http://schemas.microsoft.com/office/drawing/2010/main" val="0"/>
               </a:ext>
             </a:extLst>
           </a:blip>
@@ -8173,8 +8172,13 @@
             </a:br>
             <a:r>
               <a:rPr lang="en-US" dirty="0" smtClean="0"/>
-              <a:t>Sascha Scholz (SAP), Steffen Pingel (Tasktop)</a:t>
-            </a:r>
+              <a:t>Sascha </a:t>
+            </a:r>
+            <a:r>
+              <a:rPr lang="en-US" dirty="0" smtClean="0"/>
+              <a:t>Scholz</a:t>
+            </a:r>
+            <a:endParaRPr lang="en-US" dirty="0" smtClean="0"/>
           </a:p>
         </p:txBody>
       </p:sp>
@@ -8194,7 +8198,7 @@
 </file>
 
 <file path=ppt/slides/slide10.xml><?xml version="1.0" encoding="utf-8"?>
-<p:sld xmlns:a="http://schemas.openxmlformats.org/drawingml/2006/main" xmlns:r="http://schemas.openxmlformats.org/officeDocument/2006/relationships" xmlns:p="http://schemas.openxmlformats.org/presentationml/2006/main">
+<p:sld xmlns:a="http://schemas.openxmlformats.org/drawingml/2006/main" xmlns:r="http://schemas.openxmlformats.org/officeDocument/2006/relationships" xmlns:p="http://schemas.openxmlformats.org/presentationml/2006/main" show="0">
   <p:cSld>
     <p:spTree>
       <p:nvGrpSpPr>
@@ -8223,7 +8227,7 @@
             <a:lum bright="-20000"/>
             <a:extLst>
               <a:ext uri="{28A0092B-C50C-407E-A947-70E740481C1C}">
-                <a14:useLocalDpi xmlns:a14="http://schemas.microsoft.com/office/drawing/2010/main" xmlns=""/>
+                <a14:useLocalDpi xmlns="" xmlns:a14="http://schemas.microsoft.com/office/drawing/2010/main"/>
               </a:ext>
             </a:extLst>
           </a:blip>
@@ -8254,7 +8258,7 @@
             <a:lum bright="-10000"/>
             <a:extLst>
               <a:ext uri="{28A0092B-C50C-407E-A947-70E740481C1C}">
-                <a14:useLocalDpi xmlns:a14="http://schemas.microsoft.com/office/drawing/2010/main" xmlns=""/>
+                <a14:useLocalDpi xmlns="" xmlns:a14="http://schemas.microsoft.com/office/drawing/2010/main"/>
               </a:ext>
             </a:extLst>
           </a:blip>
@@ -8596,7 +8600,7 @@
           <a:blip r:embed="rId4" cstate="print">
             <a:extLst>
               <a:ext uri="{BEBA8EAE-BF5A-486C-A8C5-ECC9F3942E4B}">
-                <a14:imgProps xmlns:a14="http://schemas.microsoft.com/office/drawing/2010/main" xmlns="">
+                <a14:imgProps xmlns="" xmlns:a14="http://schemas.microsoft.com/office/drawing/2010/main">
                   <a14:imgLayer r:embed="rId5">
                     <a14:imgEffect>
                       <a14:saturation sat="33000"/>
@@ -8636,7 +8640,7 @@
             <a:lum bright="-10000"/>
             <a:extLst>
               <a:ext uri="{28A0092B-C50C-407E-A947-70E740481C1C}">
-                <a14:useLocalDpi xmlns:a14="http://schemas.microsoft.com/office/drawing/2010/main" xmlns=""/>
+                <a14:useLocalDpi xmlns="" xmlns:a14="http://schemas.microsoft.com/office/drawing/2010/main"/>
               </a:ext>
             </a:extLst>
           </a:blip>
@@ -8960,7 +8964,7 @@
           <a:blip r:embed="rId4" cstate="print">
             <a:extLst>
               <a:ext uri="{BEBA8EAE-BF5A-486C-A8C5-ECC9F3942E4B}">
-                <a14:imgProps xmlns:a14="http://schemas.microsoft.com/office/drawing/2010/main" xmlns="">
+                <a14:imgProps xmlns="" xmlns:a14="http://schemas.microsoft.com/office/drawing/2010/main">
                   <a14:imgLayer r:embed="rId5">
                     <a14:imgEffect>
                       <a14:saturation sat="33000"/>
@@ -8999,7 +9003,7 @@
           <a:blip r:embed="rId4" cstate="print">
             <a:extLst>
               <a:ext uri="{BEBA8EAE-BF5A-486C-A8C5-ECC9F3942E4B}">
-                <a14:imgProps xmlns:a14="http://schemas.microsoft.com/office/drawing/2010/main" xmlns="">
+                <a14:imgProps xmlns="" xmlns:a14="http://schemas.microsoft.com/office/drawing/2010/main">
                   <a14:imgLayer r:embed="rId5">
                     <a14:imgEffect>
                       <a14:saturation sat="33000"/>
@@ -10190,11 +10194,7 @@
             <a:pPr lvl="1"/>
             <a:r>
               <a:rPr lang="en-US" dirty="0" smtClean="0"/>
-              <a:t>Jenkins/</a:t>
-            </a:r>
-            <a:r>
-              <a:rPr lang="en-US" dirty="0" smtClean="0"/>
-              <a:t>Hudson Connector</a:t>
+              <a:t>Jenkins/Hudson Connector</a:t>
             </a:r>
           </a:p>
           <a:p>
@@ -10247,7 +10247,6 @@
               <a:rPr lang="en-US" dirty="0" smtClean="0"/>
               <a:t>Mylyn 3.6 will be released as part of Indigo on June 22.</a:t>
             </a:r>
-            <a:endParaRPr lang="en-US" dirty="0" smtClean="0"/>
           </a:p>
         </p:txBody>
       </p:sp>
@@ -10907,7 +10906,7 @@
     </p:spTree>
     <p:extLst>
       <p:ext uri="{BB962C8B-B14F-4D97-AF65-F5344CB8AC3E}">
-        <p14:creationId xmlns="" xmlns:p14="http://schemas.microsoft.com/office/powerpoint/2010/main" val="3142921521"/>
+        <p14:creationId xmlns:p14="http://schemas.microsoft.com/office/powerpoint/2010/main" xmlns="" val="3142921521"/>
       </p:ext>
     </p:extLst>
   </p:cSld>
@@ -11317,7 +11316,7 @@
     </p:spTree>
     <p:extLst>
       <p:ext uri="{BB962C8B-B14F-4D97-AF65-F5344CB8AC3E}">
-        <p14:creationId xmlns="" xmlns:p14="http://schemas.microsoft.com/office/powerpoint/2010/main" val="3498361825"/>
+        <p14:creationId xmlns:p14="http://schemas.microsoft.com/office/powerpoint/2010/main" xmlns="" val="3498361825"/>
       </p:ext>
     </p:extLst>
   </p:cSld>
@@ -12098,7 +12097,7 @@
               <a:lum bright="-10000"/>
               <a:extLst>
                 <a:ext uri="{28A0092B-C50C-407E-A947-70E740481C1C}">
-                  <a14:useLocalDpi xmlns:a14="http://schemas.microsoft.com/office/drawing/2010/main" xmlns=""/>
+                  <a14:useLocalDpi xmlns="" xmlns:a14="http://schemas.microsoft.com/office/drawing/2010/main"/>
                 </a:ext>
               </a:extLst>
             </a:blip>
@@ -12261,7 +12260,7 @@
               <a:lum bright="-10000"/>
               <a:extLst>
                 <a:ext uri="{28A0092B-C50C-407E-A947-70E740481C1C}">
-                  <a14:useLocalDpi xmlns:a14="http://schemas.microsoft.com/office/drawing/2010/main" xmlns=""/>
+                  <a14:useLocalDpi xmlns="" xmlns:a14="http://schemas.microsoft.com/office/drawing/2010/main"/>
                 </a:ext>
               </a:extLst>
             </a:blip>
@@ -12424,7 +12423,7 @@
               <a:lum bright="-10000"/>
               <a:extLst>
                 <a:ext uri="{28A0092B-C50C-407E-A947-70E740481C1C}">
-                  <a14:useLocalDpi xmlns:a14="http://schemas.microsoft.com/office/drawing/2010/main" xmlns=""/>
+                  <a14:useLocalDpi xmlns="" xmlns:a14="http://schemas.microsoft.com/office/drawing/2010/main"/>
                 </a:ext>
               </a:extLst>
             </a:blip>
@@ -12587,7 +12586,7 @@
               <a:lum bright="-20000"/>
               <a:extLst>
                 <a:ext uri="{28A0092B-C50C-407E-A947-70E740481C1C}">
-                  <a14:useLocalDpi xmlns:a14="http://schemas.microsoft.com/office/drawing/2010/main" xmlns=""/>
+                  <a14:useLocalDpi xmlns="" xmlns:a14="http://schemas.microsoft.com/office/drawing/2010/main"/>
                 </a:ext>
               </a:extLst>
             </a:blip>
@@ -12728,7 +12727,7 @@
               <a:lum bright="-10000"/>
               <a:extLst>
                 <a:ext uri="{28A0092B-C50C-407E-A947-70E740481C1C}">
-                  <a14:useLocalDpi xmlns:a14="http://schemas.microsoft.com/office/drawing/2010/main" xmlns=""/>
+                  <a14:useLocalDpi xmlns="" xmlns:a14="http://schemas.microsoft.com/office/drawing/2010/main"/>
                 </a:ext>
               </a:extLst>
             </a:blip>
@@ -13855,7 +13854,7 @@
     </p:spTree>
     <p:extLst>
       <p:ext uri="{BB962C8B-B14F-4D97-AF65-F5344CB8AC3E}">
-        <p14:creationId xmlns:p14="http://schemas.microsoft.com/office/powerpoint/2010/main" xmlns="" val="1573040809"/>
+        <p14:creationId xmlns="" xmlns:p14="http://schemas.microsoft.com/office/powerpoint/2010/main" val="1573040809"/>
       </p:ext>
     </p:extLst>
   </p:cSld>
@@ -14545,7 +14544,7 @@
 </file>
 
 <file path=ppt/slides/slide5.xml><?xml version="1.0" encoding="utf-8"?>
-<p:sld xmlns:a="http://schemas.openxmlformats.org/drawingml/2006/main" xmlns:r="http://schemas.openxmlformats.org/officeDocument/2006/relationships" xmlns:p="http://schemas.openxmlformats.org/presentationml/2006/main" show="0">
+<p:sld xmlns:a="http://schemas.openxmlformats.org/drawingml/2006/main" xmlns:r="http://schemas.openxmlformats.org/officeDocument/2006/relationships" xmlns:p="http://schemas.openxmlformats.org/presentationml/2006/main">
   <p:cSld>
     <p:spTree>
       <p:nvGrpSpPr>
@@ -14782,14 +14781,14 @@
             <a:effectLst/>
             <a:extLst>
               <a:ext uri="{909E8E84-426E-40dd-AFC4-6F175D3DCCD1}">
-                <a14:hiddenFill xmlns="" xmlns:a14="http://schemas.microsoft.com/office/drawing/2010/main">
+                <a14:hiddenFill xmlns:a14="http://schemas.microsoft.com/office/drawing/2010/main" xmlns="">
                   <a:solidFill>
                     <a:schemeClr val="accent1"/>
                   </a:solidFill>
                 </a14:hiddenFill>
               </a:ext>
               <a:ext uri="{91240B29-F687-4f45-9708-019B960494DF}">
-                <a14:hiddenLine xmlns="" xmlns:a14="http://schemas.microsoft.com/office/drawing/2010/main" w="9525">
+                <a14:hiddenLine xmlns:a14="http://schemas.microsoft.com/office/drawing/2010/main" xmlns="" w="9525">
                   <a:solidFill>
                     <a:schemeClr val="tx1"/>
                   </a:solidFill>
@@ -14799,7 +14798,7 @@
                 </a14:hiddenLine>
               </a:ext>
               <a:ext uri="{AF507438-7753-43e0-B8FC-AC1667EBCBE1}">
-                <a14:hiddenEffects xmlns="" xmlns:a14="http://schemas.microsoft.com/office/drawing/2010/main">
+                <a14:hiddenEffects xmlns:a14="http://schemas.microsoft.com/office/drawing/2010/main" xmlns="">
                   <a:effectLst>
                     <a:outerShdw blurRad="63500" dist="38099" dir="2700000" algn="ctr" rotWithShape="0">
                       <a:schemeClr val="bg2">
@@ -14996,14 +14995,14 @@
             <a:effectLst/>
             <a:extLst>
               <a:ext uri="{909E8E84-426E-40dd-AFC4-6F175D3DCCD1}">
-                <a14:hiddenFill xmlns="" xmlns:a14="http://schemas.microsoft.com/office/drawing/2010/main">
+                <a14:hiddenFill xmlns:a14="http://schemas.microsoft.com/office/drawing/2010/main" xmlns="">
                   <a:solidFill>
                     <a:schemeClr val="accent1"/>
                   </a:solidFill>
                 </a14:hiddenFill>
               </a:ext>
               <a:ext uri="{91240B29-F687-4f45-9708-019B960494DF}">
-                <a14:hiddenLine xmlns="" xmlns:a14="http://schemas.microsoft.com/office/drawing/2010/main" w="9525">
+                <a14:hiddenLine xmlns:a14="http://schemas.microsoft.com/office/drawing/2010/main" xmlns="" w="9525">
                   <a:solidFill>
                     <a:schemeClr val="tx1"/>
                   </a:solidFill>
@@ -15013,7 +15012,7 @@
                 </a14:hiddenLine>
               </a:ext>
               <a:ext uri="{AF507438-7753-43e0-B8FC-AC1667EBCBE1}">
-                <a14:hiddenEffects xmlns="" xmlns:a14="http://schemas.microsoft.com/office/drawing/2010/main">
+                <a14:hiddenEffects xmlns:a14="http://schemas.microsoft.com/office/drawing/2010/main" xmlns="">
                   <a:effectLst>
                     <a:outerShdw blurRad="63500" dist="38099" dir="2700000" algn="ctr" rotWithShape="0">
                       <a:schemeClr val="bg2">
@@ -15210,14 +15209,14 @@
             <a:effectLst/>
             <a:extLst>
               <a:ext uri="{909E8E84-426E-40dd-AFC4-6F175D3DCCD1}">
-                <a14:hiddenFill xmlns="" xmlns:a14="http://schemas.microsoft.com/office/drawing/2010/main">
+                <a14:hiddenFill xmlns:a14="http://schemas.microsoft.com/office/drawing/2010/main" xmlns="">
                   <a:solidFill>
                     <a:schemeClr val="accent1"/>
                   </a:solidFill>
                 </a14:hiddenFill>
               </a:ext>
               <a:ext uri="{91240B29-F687-4f45-9708-019B960494DF}">
-                <a14:hiddenLine xmlns="" xmlns:a14="http://schemas.microsoft.com/office/drawing/2010/main" w="9525">
+                <a14:hiddenLine xmlns:a14="http://schemas.microsoft.com/office/drawing/2010/main" xmlns="" w="9525">
                   <a:solidFill>
                     <a:schemeClr val="tx1"/>
                   </a:solidFill>
@@ -15227,7 +15226,7 @@
                 </a14:hiddenLine>
               </a:ext>
               <a:ext uri="{AF507438-7753-43e0-B8FC-AC1667EBCBE1}">
-                <a14:hiddenEffects xmlns="" xmlns:a14="http://schemas.microsoft.com/office/drawing/2010/main">
+                <a14:hiddenEffects xmlns:a14="http://schemas.microsoft.com/office/drawing/2010/main" xmlns="">
                   <a:effectLst>
                     <a:outerShdw blurRad="63500" dist="38099" dir="2700000" algn="ctr" rotWithShape="0">
                       <a:schemeClr val="bg2">
@@ -15488,14 +15487,14 @@
             <a:effectLst/>
             <a:extLst>
               <a:ext uri="{909E8E84-426E-40dd-AFC4-6F175D3DCCD1}">
-                <a14:hiddenFill xmlns="" xmlns:a14="http://schemas.microsoft.com/office/drawing/2010/main">
+                <a14:hiddenFill xmlns:a14="http://schemas.microsoft.com/office/drawing/2010/main" xmlns="">
                   <a:solidFill>
                     <a:schemeClr val="accent1"/>
                   </a:solidFill>
                 </a14:hiddenFill>
               </a:ext>
               <a:ext uri="{91240B29-F687-4f45-9708-019B960494DF}">
-                <a14:hiddenLine xmlns="" xmlns:a14="http://schemas.microsoft.com/office/drawing/2010/main" w="9525">
+                <a14:hiddenLine xmlns:a14="http://schemas.microsoft.com/office/drawing/2010/main" xmlns="" w="9525">
                   <a:solidFill>
                     <a:schemeClr val="tx1"/>
                   </a:solidFill>
@@ -15505,7 +15504,7 @@
                 </a14:hiddenLine>
               </a:ext>
               <a:ext uri="{AF507438-7753-43e0-B8FC-AC1667EBCBE1}">
-                <a14:hiddenEffects xmlns="" xmlns:a14="http://schemas.microsoft.com/office/drawing/2010/main">
+                <a14:hiddenEffects xmlns:a14="http://schemas.microsoft.com/office/drawing/2010/main" xmlns="">
                   <a:effectLst>
                     <a:outerShdw blurRad="63500" dist="38099" dir="2700000" algn="ctr" rotWithShape="0">
                       <a:schemeClr val="bg2">
@@ -15734,14 +15733,14 @@
             <a:effectLst/>
             <a:extLst>
               <a:ext uri="{909E8E84-426E-40dd-AFC4-6F175D3DCCD1}">
-                <a14:hiddenFill xmlns="" xmlns:a14="http://schemas.microsoft.com/office/drawing/2010/main">
+                <a14:hiddenFill xmlns:a14="http://schemas.microsoft.com/office/drawing/2010/main" xmlns="">
                   <a:solidFill>
                     <a:schemeClr val="accent1"/>
                   </a:solidFill>
                 </a14:hiddenFill>
               </a:ext>
               <a:ext uri="{91240B29-F687-4f45-9708-019B960494DF}">
-                <a14:hiddenLine xmlns="" xmlns:a14="http://schemas.microsoft.com/office/drawing/2010/main" w="9525">
+                <a14:hiddenLine xmlns:a14="http://schemas.microsoft.com/office/drawing/2010/main" xmlns="" w="9525">
                   <a:solidFill>
                     <a:schemeClr val="tx1"/>
                   </a:solidFill>
@@ -15751,7 +15750,7 @@
                 </a14:hiddenLine>
               </a:ext>
               <a:ext uri="{AF507438-7753-43e0-B8FC-AC1667EBCBE1}">
-                <a14:hiddenEffects xmlns="" xmlns:a14="http://schemas.microsoft.com/office/drawing/2010/main">
+                <a14:hiddenEffects xmlns:a14="http://schemas.microsoft.com/office/drawing/2010/main" xmlns="">
                   <a:effectLst>
                     <a:outerShdw blurRad="63500" dist="38099" dir="2700000" algn="ctr" rotWithShape="0">
                       <a:schemeClr val="bg2">
@@ -15980,14 +15979,14 @@
             <a:effectLst/>
             <a:extLst>
               <a:ext uri="{909E8E84-426E-40dd-AFC4-6F175D3DCCD1}">
-                <a14:hiddenFill xmlns="" xmlns:a14="http://schemas.microsoft.com/office/drawing/2010/main">
+                <a14:hiddenFill xmlns:a14="http://schemas.microsoft.com/office/drawing/2010/main" xmlns="">
                   <a:solidFill>
                     <a:schemeClr val="accent1"/>
                   </a:solidFill>
                 </a14:hiddenFill>
               </a:ext>
               <a:ext uri="{91240B29-F687-4f45-9708-019B960494DF}">
-                <a14:hiddenLine xmlns="" xmlns:a14="http://schemas.microsoft.com/office/drawing/2010/main" w="9525">
+                <a14:hiddenLine xmlns:a14="http://schemas.microsoft.com/office/drawing/2010/main" xmlns="" w="9525">
                   <a:solidFill>
                     <a:schemeClr val="tx1"/>
                   </a:solidFill>
@@ -15997,7 +15996,7 @@
                 </a14:hiddenLine>
               </a:ext>
               <a:ext uri="{AF507438-7753-43e0-B8FC-AC1667EBCBE1}">
-                <a14:hiddenEffects xmlns="" xmlns:a14="http://schemas.microsoft.com/office/drawing/2010/main">
+                <a14:hiddenEffects xmlns:a14="http://schemas.microsoft.com/office/drawing/2010/main" xmlns="">
                   <a:effectLst>
                     <a:outerShdw blurRad="63500" dist="38099" dir="2700000" algn="ctr" rotWithShape="0">
                       <a:schemeClr val="bg2">
@@ -16194,14 +16193,14 @@
             <a:effectLst/>
             <a:extLst>
               <a:ext uri="{909E8E84-426E-40dd-AFC4-6F175D3DCCD1}">
-                <a14:hiddenFill xmlns="" xmlns:a14="http://schemas.microsoft.com/office/drawing/2010/main">
+                <a14:hiddenFill xmlns:a14="http://schemas.microsoft.com/office/drawing/2010/main" xmlns="">
                   <a:solidFill>
                     <a:schemeClr val="accent1"/>
                   </a:solidFill>
                 </a14:hiddenFill>
               </a:ext>
               <a:ext uri="{91240B29-F687-4f45-9708-019B960494DF}">
-                <a14:hiddenLine xmlns="" xmlns:a14="http://schemas.microsoft.com/office/drawing/2010/main" w="9525">
+                <a14:hiddenLine xmlns:a14="http://schemas.microsoft.com/office/drawing/2010/main" xmlns="" w="9525">
                   <a:solidFill>
                     <a:schemeClr val="tx1"/>
                   </a:solidFill>
@@ -16211,7 +16210,7 @@
                 </a14:hiddenLine>
               </a:ext>
               <a:ext uri="{AF507438-7753-43e0-B8FC-AC1667EBCBE1}">
-                <a14:hiddenEffects xmlns="" xmlns:a14="http://schemas.microsoft.com/office/drawing/2010/main">
+                <a14:hiddenEffects xmlns:a14="http://schemas.microsoft.com/office/drawing/2010/main" xmlns="">
                   <a:effectLst>
                     <a:outerShdw blurRad="63500" dist="38099" dir="2700000" algn="ctr" rotWithShape="0">
                       <a:schemeClr val="bg2">
@@ -16472,14 +16471,14 @@
             <a:effectLst/>
             <a:extLst>
               <a:ext uri="{909E8E84-426E-40dd-AFC4-6F175D3DCCD1}">
-                <a14:hiddenFill xmlns="" xmlns:a14="http://schemas.microsoft.com/office/drawing/2010/main">
+                <a14:hiddenFill xmlns:a14="http://schemas.microsoft.com/office/drawing/2010/main" xmlns="">
                   <a:solidFill>
                     <a:schemeClr val="accent1"/>
                   </a:solidFill>
                 </a14:hiddenFill>
               </a:ext>
               <a:ext uri="{91240B29-F687-4f45-9708-019B960494DF}">
-                <a14:hiddenLine xmlns="" xmlns:a14="http://schemas.microsoft.com/office/drawing/2010/main" w="9525">
+                <a14:hiddenLine xmlns:a14="http://schemas.microsoft.com/office/drawing/2010/main" xmlns="" w="9525">
                   <a:solidFill>
                     <a:schemeClr val="tx1"/>
                   </a:solidFill>
@@ -16489,7 +16488,7 @@
                 </a14:hiddenLine>
               </a:ext>
               <a:ext uri="{AF507438-7753-43e0-B8FC-AC1667EBCBE1}">
-                <a14:hiddenEffects xmlns="" xmlns:a14="http://schemas.microsoft.com/office/drawing/2010/main">
+                <a14:hiddenEffects xmlns:a14="http://schemas.microsoft.com/office/drawing/2010/main" xmlns="">
                   <a:effectLst>
                     <a:outerShdw blurRad="63500" dist="38099" dir="2700000" algn="ctr" rotWithShape="0">
                       <a:schemeClr val="bg2">
@@ -16718,14 +16717,14 @@
             <a:effectLst/>
             <a:extLst>
               <a:ext uri="{909E8E84-426E-40dd-AFC4-6F175D3DCCD1}">
-                <a14:hiddenFill xmlns="" xmlns:a14="http://schemas.microsoft.com/office/drawing/2010/main">
+                <a14:hiddenFill xmlns:a14="http://schemas.microsoft.com/office/drawing/2010/main" xmlns="">
                   <a:solidFill>
                     <a:schemeClr val="accent1"/>
                   </a:solidFill>
                 </a14:hiddenFill>
               </a:ext>
               <a:ext uri="{91240B29-F687-4f45-9708-019B960494DF}">
-                <a14:hiddenLine xmlns="" xmlns:a14="http://schemas.microsoft.com/office/drawing/2010/main" w="9525">
+                <a14:hiddenLine xmlns:a14="http://schemas.microsoft.com/office/drawing/2010/main" xmlns="" w="9525">
                   <a:solidFill>
                     <a:schemeClr val="tx1"/>
                   </a:solidFill>
@@ -16735,7 +16734,7 @@
                 </a14:hiddenLine>
               </a:ext>
               <a:ext uri="{AF507438-7753-43e0-B8FC-AC1667EBCBE1}">
-                <a14:hiddenEffects xmlns="" xmlns:a14="http://schemas.microsoft.com/office/drawing/2010/main">
+                <a14:hiddenEffects xmlns:a14="http://schemas.microsoft.com/office/drawing/2010/main" xmlns="">
                   <a:effectLst>
                     <a:outerShdw blurRad="63500" dist="38099" dir="2700000" algn="ctr" rotWithShape="0">
                       <a:schemeClr val="bg2">
@@ -16964,14 +16963,14 @@
             <a:effectLst/>
             <a:extLst>
               <a:ext uri="{909E8E84-426E-40dd-AFC4-6F175D3DCCD1}">
-                <a14:hiddenFill xmlns="" xmlns:a14="http://schemas.microsoft.com/office/drawing/2010/main">
+                <a14:hiddenFill xmlns:a14="http://schemas.microsoft.com/office/drawing/2010/main" xmlns="">
                   <a:solidFill>
                     <a:schemeClr val="accent1"/>
                   </a:solidFill>
                 </a14:hiddenFill>
               </a:ext>
               <a:ext uri="{91240B29-F687-4f45-9708-019B960494DF}">
-                <a14:hiddenLine xmlns="" xmlns:a14="http://schemas.microsoft.com/office/drawing/2010/main" w="9525">
+                <a14:hiddenLine xmlns:a14="http://schemas.microsoft.com/office/drawing/2010/main" xmlns="" w="9525">
                   <a:solidFill>
                     <a:schemeClr val="tx1"/>
                   </a:solidFill>
@@ -16981,7 +16980,7 @@
                 </a14:hiddenLine>
               </a:ext>
               <a:ext uri="{AF507438-7753-43e0-B8FC-AC1667EBCBE1}">
-                <a14:hiddenEffects xmlns="" xmlns:a14="http://schemas.microsoft.com/office/drawing/2010/main">
+                <a14:hiddenEffects xmlns:a14="http://schemas.microsoft.com/office/drawing/2010/main" xmlns="">
                   <a:effectLst>
                     <a:outerShdw blurRad="63500" dist="38099" dir="2700000" algn="ctr" rotWithShape="0">
                       <a:schemeClr val="bg2">
@@ -17210,14 +17209,14 @@
             <a:effectLst/>
             <a:extLst>
               <a:ext uri="{909E8E84-426E-40dd-AFC4-6F175D3DCCD1}">
-                <a14:hiddenFill xmlns="" xmlns:a14="http://schemas.microsoft.com/office/drawing/2010/main">
+                <a14:hiddenFill xmlns:a14="http://schemas.microsoft.com/office/drawing/2010/main" xmlns="">
                   <a:solidFill>
                     <a:schemeClr val="accent1"/>
                   </a:solidFill>
                 </a14:hiddenFill>
               </a:ext>
               <a:ext uri="{91240B29-F687-4f45-9708-019B960494DF}">
-                <a14:hiddenLine xmlns="" xmlns:a14="http://schemas.microsoft.com/office/drawing/2010/main" w="9525">
+                <a14:hiddenLine xmlns:a14="http://schemas.microsoft.com/office/drawing/2010/main" xmlns="" w="9525">
                   <a:solidFill>
                     <a:schemeClr val="tx1"/>
                   </a:solidFill>
@@ -17227,7 +17226,7 @@
                 </a14:hiddenLine>
               </a:ext>
               <a:ext uri="{AF507438-7753-43e0-B8FC-AC1667EBCBE1}">
-                <a14:hiddenEffects xmlns="" xmlns:a14="http://schemas.microsoft.com/office/drawing/2010/main">
+                <a14:hiddenEffects xmlns:a14="http://schemas.microsoft.com/office/drawing/2010/main" xmlns="">
                   <a:effectLst>
                     <a:outerShdw blurRad="63500" dist="38099" dir="2700000" algn="ctr" rotWithShape="0">
                       <a:schemeClr val="bg2">
@@ -17446,7 +17445,6 @@
               <a:rPr lang="en-US" dirty="0" smtClean="0"/>
               <a:t>Continuous Integration Server</a:t>
             </a:r>
-            <a:endParaRPr lang="en-US" dirty="0" smtClean="0"/>
           </a:p>
           <a:p>
             <a:pPr marL="342900" lvl="0" indent="-342900">
@@ -17455,11 +17453,7 @@
             </a:pPr>
             <a:r>
               <a:rPr lang="en-US" dirty="0" smtClean="0"/>
-              <a:t>Open </a:t>
-            </a:r>
-            <a:r>
-              <a:rPr lang="en-US" dirty="0" smtClean="0"/>
-              <a:t>source</a:t>
+              <a:t>Open source</a:t>
             </a:r>
           </a:p>
           <a:p>
@@ -17491,7 +17485,6 @@
               <a:rPr lang="en-US" dirty="0" smtClean="0"/>
               <a:t>Mylyn integrates with both</a:t>
             </a:r>
-            <a:endParaRPr lang="en-US" dirty="0" smtClean="0"/>
           </a:p>
         </p:txBody>
       </p:sp>
@@ -17507,7 +17500,7 @@
           <a:blip r:embed="rId3" cstate="print">
             <a:extLst>
               <a:ext uri="{28A0092B-C50C-407E-A947-70E740481C1C}">
-                <a14:useLocalDpi xmlns="" xmlns:a14="http://schemas.microsoft.com/office/drawing/2010/main" val="0"/>
+                <a14:useLocalDpi xmlns:a14="http://schemas.microsoft.com/office/drawing/2010/main" xmlns="" val="0"/>
               </a:ext>
             </a:extLst>
           </a:blip>
@@ -17527,7 +17520,7 @@
           <a:noFill/>
           <a:extLst>
             <a:ext uri="{909E8E84-426E-40DD-AFC4-6F175D3DCCD1}">
-              <a14:hiddenFill xmlns="" xmlns:a14="http://schemas.microsoft.com/office/drawing/2010/main">
+              <a14:hiddenFill xmlns:a14="http://schemas.microsoft.com/office/drawing/2010/main" xmlns="">
                 <a:solidFill>
                   <a:srgbClr val="FFFFFF"/>
                 </a:solidFill>
@@ -17623,25 +17616,8 @@
             </a:pPr>
             <a:r>
               <a:rPr lang="en-US" dirty="0" smtClean="0"/>
-              <a:t>Open </a:t>
-            </a:r>
-            <a:r>
-              <a:rPr lang="en-US" dirty="0" smtClean="0"/>
-              <a:t>source </a:t>
-            </a:r>
-            <a:r>
-              <a:rPr lang="en-US" dirty="0" smtClean="0"/>
-              <a:t>(Apache </a:t>
-            </a:r>
-            <a:r>
-              <a:rPr lang="en-US" dirty="0" smtClean="0"/>
-              <a:t>L</a:t>
-            </a:r>
-            <a:r>
-              <a:rPr lang="en-US" dirty="0" smtClean="0"/>
-              <a:t>icense 2.0)</a:t>
-            </a:r>
-            <a:endParaRPr lang="en-US" dirty="0" smtClean="0"/>
+              <a:t>Open source (Apache License 2.0)</a:t>
+            </a:r>
           </a:p>
           <a:p>
             <a:pPr marL="342900" lvl="0" indent="-342900">
@@ -17650,31 +17626,15 @@
             </a:pPr>
             <a:r>
               <a:rPr lang="en-US" dirty="0" smtClean="0"/>
-              <a:t>Serves </a:t>
+              <a:t>Serves as a </a:t>
+            </a:r>
+            <a:r>
+              <a:rPr lang="en-US" dirty="0" err="1" smtClean="0"/>
+              <a:t>Git</a:t>
             </a:r>
             <a:r>
               <a:rPr lang="en-US" dirty="0" smtClean="0"/>
-              <a:t>as </a:t>
-            </a:r>
-            <a:r>
-              <a:rPr lang="en-US" dirty="0" smtClean="0"/>
-              <a:t>a </a:t>
-            </a:r>
-            <a:r>
-              <a:rPr lang="en-US" dirty="0" err="1" smtClean="0"/>
-              <a:t>G</a:t>
-            </a:r>
-            <a:r>
-              <a:rPr lang="en-US" dirty="0" err="1" smtClean="0"/>
-              <a:t>it</a:t>
-            </a:r>
-            <a:r>
-              <a:rPr lang="en-US" dirty="0" smtClean="0"/>
-              <a:t> </a:t>
-            </a:r>
-            <a:r>
-              <a:rPr lang="en-US" dirty="0" smtClean="0"/>
-              <a:t>server adding access control and workflow</a:t>
+              <a:t> server adding access control and workflow</a:t>
             </a:r>
           </a:p>
           <a:p>
@@ -17856,11 +17816,7 @@
             </a:pPr>
             <a:r>
               <a:rPr lang="en-US" dirty="0" smtClean="0"/>
-              <a:t>Each change is based on the master branch to have a stable starting </a:t>
-            </a:r>
-            <a:r>
-              <a:rPr lang="en-US" dirty="0" smtClean="0"/>
-              <a:t>point</a:t>
+              <a:t>Each change is based on the master branch to have a stable starting point</a:t>
             </a:r>
           </a:p>
           <a:p>
@@ -17870,11 +17826,7 @@
             </a:pPr>
             <a:r>
               <a:rPr lang="en-US" dirty="0" smtClean="0"/>
-              <a:t>Typical </a:t>
-            </a:r>
-            <a:r>
-              <a:rPr lang="en-US" dirty="0" smtClean="0"/>
-              <a:t>workflow</a:t>
+              <a:t>Typical workflow</a:t>
             </a:r>
           </a:p>
           <a:p>

</xml_diff>